<commit_message>
logic flow version 1 added
</commit_message>
<xml_diff>
--- a/Documentaries/WeCovenant_UI_Design.pptx
+++ b/Documentaries/WeCovenant_UI_Design.pptx
@@ -5,20 +5,21 @@
     <p:sldMasterId id="2147483672" r:id="rId1"/>
   </p:sldMasterIdLst>
   <p:sldIdLst>
-    <p:sldId id="256" r:id="rId2"/>
-    <p:sldId id="257" r:id="rId3"/>
-    <p:sldId id="258" r:id="rId4"/>
-    <p:sldId id="259" r:id="rId5"/>
-    <p:sldId id="260" r:id="rId6"/>
-    <p:sldId id="261" r:id="rId7"/>
-    <p:sldId id="262" r:id="rId8"/>
-    <p:sldId id="263" r:id="rId9"/>
-    <p:sldId id="264" r:id="rId10"/>
-    <p:sldId id="265" r:id="rId11"/>
-    <p:sldId id="266" r:id="rId12"/>
-    <p:sldId id="268" r:id="rId13"/>
-    <p:sldId id="269" r:id="rId14"/>
-    <p:sldId id="267" r:id="rId15"/>
+    <p:sldId id="270" r:id="rId2"/>
+    <p:sldId id="256" r:id="rId3"/>
+    <p:sldId id="257" r:id="rId4"/>
+    <p:sldId id="258" r:id="rId5"/>
+    <p:sldId id="259" r:id="rId6"/>
+    <p:sldId id="260" r:id="rId7"/>
+    <p:sldId id="261" r:id="rId8"/>
+    <p:sldId id="262" r:id="rId9"/>
+    <p:sldId id="263" r:id="rId10"/>
+    <p:sldId id="264" r:id="rId11"/>
+    <p:sldId id="265" r:id="rId12"/>
+    <p:sldId id="266" r:id="rId13"/>
+    <p:sldId id="268" r:id="rId14"/>
+    <p:sldId id="269" r:id="rId15"/>
+    <p:sldId id="267" r:id="rId16"/>
   </p:sldIdLst>
   <p:sldSz cx="2519363" cy="5400675"/>
   <p:notesSz cx="6858000" cy="9144000"/>
@@ -122,6 +123,7 @@
       <p14:sectionLst xmlns:p14="http://schemas.microsoft.com/office/powerpoint/2010/main">
         <p14:section name="默认节" id="{3A12571F-5286-144E-8724-4608140B1E8B}">
           <p14:sldIdLst>
+            <p14:sldId id="270"/>
             <p14:sldId id="256"/>
           </p14:sldIdLst>
         </p14:section>
@@ -298,7 +300,7 @@
           <a:p>
             <a:fld id="{CD49B486-D400-6D46-A700-FDB3E7D5D2CF}" type="datetimeFigureOut">
               <a:rPr kumimoji="1" lang="zh-CN" altLang="en-US" smtClean="0"/>
-              <a:t>2023/1/28</a:t>
+              <a:t>2023/1/29</a:t>
             </a:fld>
             <a:endParaRPr kumimoji="1" lang="zh-CN" altLang="en-US"/>
           </a:p>
@@ -468,7 +470,7 @@
           <a:p>
             <a:fld id="{CD49B486-D400-6D46-A700-FDB3E7D5D2CF}" type="datetimeFigureOut">
               <a:rPr kumimoji="1" lang="zh-CN" altLang="en-US" smtClean="0"/>
-              <a:t>2023/1/28</a:t>
+              <a:t>2023/1/29</a:t>
             </a:fld>
             <a:endParaRPr kumimoji="1" lang="zh-CN" altLang="en-US"/>
           </a:p>
@@ -648,7 +650,7 @@
           <a:p>
             <a:fld id="{CD49B486-D400-6D46-A700-FDB3E7D5D2CF}" type="datetimeFigureOut">
               <a:rPr kumimoji="1" lang="zh-CN" altLang="en-US" smtClean="0"/>
-              <a:t>2023/1/28</a:t>
+              <a:t>2023/1/29</a:t>
             </a:fld>
             <a:endParaRPr kumimoji="1" lang="zh-CN" altLang="en-US"/>
           </a:p>
@@ -818,7 +820,7 @@
           <a:p>
             <a:fld id="{CD49B486-D400-6D46-A700-FDB3E7D5D2CF}" type="datetimeFigureOut">
               <a:rPr kumimoji="1" lang="zh-CN" altLang="en-US" smtClean="0"/>
-              <a:t>2023/1/28</a:t>
+              <a:t>2023/1/29</a:t>
             </a:fld>
             <a:endParaRPr kumimoji="1" lang="zh-CN" altLang="en-US"/>
           </a:p>
@@ -1062,7 +1064,7 @@
           <a:p>
             <a:fld id="{CD49B486-D400-6D46-A700-FDB3E7D5D2CF}" type="datetimeFigureOut">
               <a:rPr kumimoji="1" lang="zh-CN" altLang="en-US" smtClean="0"/>
-              <a:t>2023/1/28</a:t>
+              <a:t>2023/1/29</a:t>
             </a:fld>
             <a:endParaRPr kumimoji="1" lang="zh-CN" altLang="en-US"/>
           </a:p>
@@ -1294,7 +1296,7 @@
           <a:p>
             <a:fld id="{CD49B486-D400-6D46-A700-FDB3E7D5D2CF}" type="datetimeFigureOut">
               <a:rPr kumimoji="1" lang="zh-CN" altLang="en-US" smtClean="0"/>
-              <a:t>2023/1/28</a:t>
+              <a:t>2023/1/29</a:t>
             </a:fld>
             <a:endParaRPr kumimoji="1" lang="zh-CN" altLang="en-US"/>
           </a:p>
@@ -1661,7 +1663,7 @@
           <a:p>
             <a:fld id="{CD49B486-D400-6D46-A700-FDB3E7D5D2CF}" type="datetimeFigureOut">
               <a:rPr kumimoji="1" lang="zh-CN" altLang="en-US" smtClean="0"/>
-              <a:t>2023/1/28</a:t>
+              <a:t>2023/1/29</a:t>
             </a:fld>
             <a:endParaRPr kumimoji="1" lang="zh-CN" altLang="en-US"/>
           </a:p>
@@ -1779,7 +1781,7 @@
           <a:p>
             <a:fld id="{CD49B486-D400-6D46-A700-FDB3E7D5D2CF}" type="datetimeFigureOut">
               <a:rPr kumimoji="1" lang="zh-CN" altLang="en-US" smtClean="0"/>
-              <a:t>2023/1/28</a:t>
+              <a:t>2023/1/29</a:t>
             </a:fld>
             <a:endParaRPr kumimoji="1" lang="zh-CN" altLang="en-US"/>
           </a:p>
@@ -1874,7 +1876,7 @@
           <a:p>
             <a:fld id="{CD49B486-D400-6D46-A700-FDB3E7D5D2CF}" type="datetimeFigureOut">
               <a:rPr kumimoji="1" lang="zh-CN" altLang="en-US" smtClean="0"/>
-              <a:t>2023/1/28</a:t>
+              <a:t>2023/1/29</a:t>
             </a:fld>
             <a:endParaRPr kumimoji="1" lang="zh-CN" altLang="en-US"/>
           </a:p>
@@ -2151,7 +2153,7 @@
           <a:p>
             <a:fld id="{CD49B486-D400-6D46-A700-FDB3E7D5D2CF}" type="datetimeFigureOut">
               <a:rPr kumimoji="1" lang="zh-CN" altLang="en-US" smtClean="0"/>
-              <a:t>2023/1/28</a:t>
+              <a:t>2023/1/29</a:t>
             </a:fld>
             <a:endParaRPr kumimoji="1" lang="zh-CN" altLang="en-US"/>
           </a:p>
@@ -2408,7 +2410,7 @@
           <a:p>
             <a:fld id="{CD49B486-D400-6D46-A700-FDB3E7D5D2CF}" type="datetimeFigureOut">
               <a:rPr kumimoji="1" lang="zh-CN" altLang="en-US" smtClean="0"/>
-              <a:t>2023/1/28</a:t>
+              <a:t>2023/1/29</a:t>
             </a:fld>
             <a:endParaRPr kumimoji="1" lang="zh-CN" altLang="en-US"/>
           </a:p>
@@ -2624,7 +2626,7 @@
           <a:p>
             <a:fld id="{CD49B486-D400-6D46-A700-FDB3E7D5D2CF}" type="datetimeFigureOut">
               <a:rPr kumimoji="1" lang="zh-CN" altLang="en-US" smtClean="0"/>
-              <a:t>2023/1/28</a:t>
+              <a:t>2023/1/29</a:t>
             </a:fld>
             <a:endParaRPr kumimoji="1" lang="zh-CN" altLang="en-US"/>
           </a:p>
@@ -3031,273 +3033,88 @@
       </p:grpSpPr>
       <p:sp>
         <p:nvSpPr>
-          <p:cNvPr id="4" name="文本框 3">
+          <p:cNvPr id="3" name="内容占位符 2">
             <a:extLst>
               <a:ext uri="{FF2B5EF4-FFF2-40B4-BE49-F238E27FC236}">
-                <a16:creationId xmlns:a16="http://schemas.microsoft.com/office/drawing/2014/main" id="{F7E91857-C3C5-3CC0-EC8F-91120C3529AE}"/>
+                <a16:creationId xmlns:a16="http://schemas.microsoft.com/office/drawing/2014/main" id="{3E524076-C967-8459-AAD2-27C15C5C6B45}"/>
               </a:ext>
             </a:extLst>
           </p:cNvPr>
-          <p:cNvSpPr txBox="1"/>
-          <p:nvPr/>
+          <p:cNvSpPr>
+            <a:spLocks noGrp="1"/>
+          </p:cNvSpPr>
+          <p:nvPr>
+            <p:ph idx="1"/>
+          </p:nvPr>
         </p:nvSpPr>
         <p:spPr>
           <a:xfrm>
-            <a:off x="-1263535" y="3175462"/>
-            <a:ext cx="877163" cy="369332"/>
-          </a:xfrm>
-          <a:prstGeom prst="rect">
-            <a:avLst/>
-          </a:prstGeom>
-          <a:noFill/>
+            <a:off x="173205" y="671773"/>
+            <a:ext cx="2172951" cy="3426679"/>
+          </a:xfrm>
         </p:spPr>
         <p:txBody>
-          <a:bodyPr wrap="none" rtlCol="0">
-            <a:spAutoFit/>
-          </a:bodyPr>
-          <a:lstStyle/>
-          <a:p>
-            <a:r>
-              <a:rPr kumimoji="1" lang="zh-CN" altLang="en-US" dirty="0">
-                <a:solidFill>
-                  <a:schemeClr val="bg1"/>
-                </a:solidFill>
-              </a:rPr>
-              <a:t>登录页</a:t>
-            </a:r>
-            <a:endParaRPr kumimoji="1" lang="en-US" altLang="zh-CN" dirty="0">
-              <a:solidFill>
-                <a:schemeClr val="bg1"/>
-              </a:solidFill>
-            </a:endParaRPr>
-          </a:p>
-        </p:txBody>
-      </p:sp>
-      <p:sp>
-        <p:nvSpPr>
-          <p:cNvPr id="5" name="圆角矩形 4">
-            <a:extLst>
-              <a:ext uri="{FF2B5EF4-FFF2-40B4-BE49-F238E27FC236}">
-                <a16:creationId xmlns:a16="http://schemas.microsoft.com/office/drawing/2014/main" id="{E57371F9-737F-B0A0-71D2-E2F7CC9E1670}"/>
-              </a:ext>
-            </a:extLst>
-          </p:cNvPr>
-          <p:cNvSpPr/>
-          <p:nvPr/>
-        </p:nvSpPr>
-        <p:spPr>
-          <a:xfrm>
-            <a:off x="216434" y="1214145"/>
-            <a:ext cx="2086494" cy="2370913"/>
-          </a:xfrm>
-          <a:prstGeom prst="roundRect">
-            <a:avLst/>
-          </a:prstGeom>
-          <a:solidFill>
-            <a:schemeClr val="tx2">
-              <a:lumMod val="20000"/>
-              <a:lumOff val="80000"/>
-            </a:schemeClr>
-          </a:solidFill>
-          <a:ln>
-            <a:noFill/>
-          </a:ln>
-        </p:spPr>
-        <p:style>
-          <a:lnRef idx="2">
-            <a:schemeClr val="accent1">
-              <a:shade val="50000"/>
-            </a:schemeClr>
-          </a:lnRef>
-          <a:fillRef idx="1">
-            <a:schemeClr val="accent1"/>
-          </a:fillRef>
-          <a:effectRef idx="0">
-            <a:schemeClr val="accent1"/>
-          </a:effectRef>
-          <a:fontRef idx="minor">
-            <a:schemeClr val="lt1"/>
-          </a:fontRef>
-        </p:style>
-        <p:txBody>
-          <a:bodyPr rtlCol="0" anchor="ctr"/>
-          <a:lstStyle/>
-          <a:p>
-            <a:pPr algn="ctr"/>
-            <a:endParaRPr kumimoji="1" lang="zh-CN" altLang="en-US"/>
-          </a:p>
-        </p:txBody>
-      </p:sp>
-      <p:sp>
-        <p:nvSpPr>
-          <p:cNvPr id="6" name="文本框 5">
-            <a:extLst>
-              <a:ext uri="{FF2B5EF4-FFF2-40B4-BE49-F238E27FC236}">
-                <a16:creationId xmlns:a16="http://schemas.microsoft.com/office/drawing/2014/main" id="{C61FFC9A-08BF-ED10-D06B-8B85CB93E1D8}"/>
-              </a:ext>
-            </a:extLst>
-          </p:cNvPr>
-          <p:cNvSpPr txBox="1"/>
-          <p:nvPr/>
-        </p:nvSpPr>
-        <p:spPr>
-          <a:xfrm>
-            <a:off x="684415" y="1465811"/>
-            <a:ext cx="1338828" cy="369332"/>
-          </a:xfrm>
-          <a:prstGeom prst="rect">
-            <a:avLst/>
-          </a:prstGeom>
-          <a:noFill/>
-        </p:spPr>
-        <p:txBody>
-          <a:bodyPr wrap="none" rtlCol="0">
-            <a:spAutoFit/>
-          </a:bodyPr>
-          <a:lstStyle/>
-          <a:p>
+          <a:bodyPr/>
+          <a:lstStyle/>
+          <a:p>
+            <a:pPr marL="228600" indent="-228600">
+              <a:buAutoNum type="arabicPeriod"/>
+            </a:pPr>
             <a:r>
               <a:rPr kumimoji="1" lang="zh-CN" altLang="en-US" dirty="0"/>
-              <a:t>授权登录？</a:t>
+              <a:t>用户一份</a:t>
             </a:r>
             <a:endParaRPr kumimoji="1" lang="en-US" altLang="zh-CN" dirty="0"/>
           </a:p>
-        </p:txBody>
-      </p:sp>
-      <p:sp>
-        <p:nvSpPr>
-          <p:cNvPr id="7" name="文本框 6">
-            <a:extLst>
-              <a:ext uri="{FF2B5EF4-FFF2-40B4-BE49-F238E27FC236}">
-                <a16:creationId xmlns:a16="http://schemas.microsoft.com/office/drawing/2014/main" id="{E0760BD3-80B0-69F5-BACC-C161C1522987}"/>
-              </a:ext>
-            </a:extLst>
-          </p:cNvPr>
-          <p:cNvSpPr txBox="1"/>
-          <p:nvPr/>
-        </p:nvSpPr>
-        <p:spPr>
-          <a:xfrm>
-            <a:off x="476548" y="3147753"/>
-            <a:ext cx="646331" cy="369332"/>
-          </a:xfrm>
-          <a:prstGeom prst="rect">
-            <a:avLst/>
-          </a:prstGeom>
-          <a:noFill/>
-        </p:spPr>
-        <p:txBody>
-          <a:bodyPr wrap="none" rtlCol="0">
-            <a:spAutoFit/>
-          </a:bodyPr>
-          <a:lstStyle/>
-          <a:p>
+          <a:p>
+            <a:pPr marL="228600" indent="-228600">
+              <a:buAutoNum type="arabicPeriod"/>
+            </a:pPr>
             <a:r>
               <a:rPr kumimoji="1" lang="zh-CN" altLang="en-US" dirty="0"/>
-              <a:t>同意</a:t>
+              <a:t>咨询师也需要注册，咨询师可以看到不同人的结果</a:t>
             </a:r>
             <a:endParaRPr kumimoji="1" lang="en-US" altLang="zh-CN" dirty="0"/>
           </a:p>
-        </p:txBody>
-      </p:sp>
-      <p:sp>
-        <p:nvSpPr>
-          <p:cNvPr id="8" name="文本框 7">
-            <a:extLst>
-              <a:ext uri="{FF2B5EF4-FFF2-40B4-BE49-F238E27FC236}">
-                <a16:creationId xmlns:a16="http://schemas.microsoft.com/office/drawing/2014/main" id="{FACC8ADB-138C-BB08-CA09-E0AE6AC1F558}"/>
-              </a:ext>
-            </a:extLst>
-          </p:cNvPr>
-          <p:cNvSpPr txBox="1"/>
-          <p:nvPr/>
-        </p:nvSpPr>
-        <p:spPr>
-          <a:xfrm>
-            <a:off x="1259681" y="3175462"/>
-            <a:ext cx="877163" cy="369332"/>
-          </a:xfrm>
-          <a:prstGeom prst="rect">
-            <a:avLst/>
-          </a:prstGeom>
-          <a:noFill/>
-        </p:spPr>
-        <p:txBody>
-          <a:bodyPr wrap="none" rtlCol="0">
-            <a:spAutoFit/>
-          </a:bodyPr>
-          <a:lstStyle/>
-          <a:p>
+          <a:p>
+            <a:pPr marL="228600" indent="-228600">
+              <a:buAutoNum type="arabicPeriod"/>
+            </a:pPr>
+            <a:r>
+              <a:rPr kumimoji="1" lang="zh-CN" altLang="en-US"/>
+              <a:t>各自测试</a:t>
+            </a:r>
             <a:r>
               <a:rPr kumimoji="1" lang="zh-CN" altLang="en-US" dirty="0"/>
-              <a:t>不同意</a:t>
+              <a:t>完之后，输入匹配账号、二维码</a:t>
             </a:r>
             <a:endParaRPr kumimoji="1" lang="en-US" altLang="zh-CN" dirty="0"/>
           </a:p>
-        </p:txBody>
-      </p:sp>
-      <p:sp>
-        <p:nvSpPr>
-          <p:cNvPr id="9" name="椭圆 8">
-            <a:extLst>
-              <a:ext uri="{FF2B5EF4-FFF2-40B4-BE49-F238E27FC236}">
-                <a16:creationId xmlns:a16="http://schemas.microsoft.com/office/drawing/2014/main" id="{F422CE90-7A56-D975-528A-7E498CEB6C2D}"/>
-              </a:ext>
-            </a:extLst>
-          </p:cNvPr>
-          <p:cNvSpPr/>
-          <p:nvPr/>
-        </p:nvSpPr>
-        <p:spPr>
-          <a:xfrm>
-            <a:off x="910669" y="4256116"/>
-            <a:ext cx="698269" cy="698269"/>
-          </a:xfrm>
-          <a:prstGeom prst="ellipse">
-            <a:avLst/>
-          </a:prstGeom>
-          <a:solidFill>
-            <a:schemeClr val="accent6">
-              <a:lumMod val="75000"/>
-            </a:schemeClr>
-          </a:solidFill>
-          <a:ln>
-            <a:noFill/>
-          </a:ln>
-        </p:spPr>
-        <p:style>
-          <a:lnRef idx="2">
-            <a:schemeClr val="accent1">
-              <a:shade val="50000"/>
-            </a:schemeClr>
-          </a:lnRef>
-          <a:fillRef idx="1">
-            <a:schemeClr val="accent1"/>
-          </a:fillRef>
-          <a:effectRef idx="0">
-            <a:schemeClr val="accent1"/>
-          </a:effectRef>
-          <a:fontRef idx="minor">
-            <a:schemeClr val="lt1"/>
-          </a:fontRef>
-        </p:style>
-        <p:txBody>
-          <a:bodyPr rtlCol="0" anchor="ctr"/>
-          <a:lstStyle/>
-          <a:p>
-            <a:pPr algn="ctr"/>
-            <a:r>
-              <a:rPr kumimoji="1" lang="en-US" altLang="zh-CN" dirty="0"/>
-              <a:t>LOGO</a:t>
-            </a:r>
-            <a:endParaRPr kumimoji="1" lang="zh-CN" altLang="en-US" dirty="0"/>
+          <a:p>
+            <a:pPr marL="228600" indent="-228600">
+              <a:buAutoNum type="arabicPeriod"/>
+            </a:pPr>
+            <a:r>
+              <a:rPr kumimoji="1" lang="zh-CN" altLang="en-US" dirty="0"/>
+              <a:t>一定要做完所有测试（可以暂停）</a:t>
+            </a:r>
+            <a:endParaRPr kumimoji="1" lang="en-US" altLang="zh-CN" dirty="0"/>
+          </a:p>
+          <a:p>
+            <a:pPr marL="228600" indent="-228600">
+              <a:buAutoNum type="arabicPeriod"/>
+            </a:pPr>
+            <a:r>
+              <a:rPr kumimoji="1" lang="zh-CN" altLang="en-US" dirty="0"/>
+              <a:t>可以修改过去测试</a:t>
+            </a:r>
           </a:p>
         </p:txBody>
       </p:sp>
     </p:spTree>
     <p:extLst>
       <p:ext uri="{BB962C8B-B14F-4D97-AF65-F5344CB8AC3E}">
-        <p14:creationId xmlns:p14="http://schemas.microsoft.com/office/powerpoint/2010/main" val="565958428"/>
+        <p14:creationId xmlns:p14="http://schemas.microsoft.com/office/powerpoint/2010/main" val="1498490321"/>
       </p:ext>
     </p:extLst>
   </p:cSld>
@@ -3409,7 +3226,7 @@
         <p:spPr>
           <a:xfrm>
             <a:off x="29094" y="1886986"/>
-            <a:ext cx="2519363" cy="1200329"/>
+            <a:ext cx="2519363" cy="646331"/>
           </a:xfrm>
           <a:prstGeom prst="rect">
             <a:avLst/>
@@ -3435,14 +3252,14 @@
           <a:p>
             <a:r>
               <a:rPr kumimoji="1" lang="zh-CN" altLang="en-US" dirty="0"/>
-              <a:t>测试结果</a:t>
+              <a:t>测试题</a:t>
             </a:r>
             <a:endParaRPr kumimoji="1" lang="en-US" altLang="zh-CN" dirty="0"/>
           </a:p>
           <a:p>
             <a:r>
-              <a:rPr kumimoji="1" lang="en-US" altLang="zh-CN" dirty="0"/>
-              <a:t>xxxxxxxxxxxxxxxxxxxxxxxxxxxxxxxxxxxxxxxxxxxxxxxxxxxxxxxxxxxxxxxxx</a:t>
+              <a:rPr kumimoji="1" lang="en-US" altLang="zh-CN" dirty="0" err="1"/>
+              <a:t>xxxxxxxxxxxxxxxx</a:t>
             </a:r>
             <a:endParaRPr kumimoji="1" lang="zh-CN" altLang="en-US" dirty="0"/>
           </a:p>
@@ -3493,8 +3310,59 @@
             </a:r>
             <a:r>
               <a:rPr kumimoji="1" lang="zh-CN" altLang="en-US" dirty="0"/>
-              <a:t>测试结果页面</a:t>
-            </a:r>
+              <a:t>测试页面</a:t>
+            </a:r>
+          </a:p>
+        </p:txBody>
+      </p:sp>
+      <p:sp>
+        <p:nvSpPr>
+          <p:cNvPr id="3" name="文本框 2">
+            <a:extLst>
+              <a:ext uri="{FF2B5EF4-FFF2-40B4-BE49-F238E27FC236}">
+                <a16:creationId xmlns:a16="http://schemas.microsoft.com/office/drawing/2014/main" id="{A7A67E33-7FA0-ABA7-606C-6483B887B4F8}"/>
+              </a:ext>
+            </a:extLst>
+          </p:cNvPr>
+          <p:cNvSpPr txBox="1"/>
+          <p:nvPr/>
+        </p:nvSpPr>
+        <p:spPr>
+          <a:xfrm>
+            <a:off x="0" y="2665173"/>
+            <a:ext cx="2519363" cy="369332"/>
+          </a:xfrm>
+          <a:prstGeom prst="rect">
+            <a:avLst/>
+          </a:prstGeom>
+          <a:solidFill>
+            <a:srgbClr val="B993A0">
+              <a:alpha val="52834"/>
+            </a:srgbClr>
+          </a:solidFill>
+          <a:ln>
+            <a:solidFill>
+              <a:schemeClr val="bg2">
+                <a:lumMod val="90000"/>
+              </a:schemeClr>
+            </a:solidFill>
+          </a:ln>
+        </p:spPr>
+        <p:txBody>
+          <a:bodyPr wrap="square" rtlCol="0">
+            <a:spAutoFit/>
+          </a:bodyPr>
+          <a:lstStyle/>
+          <a:p>
+            <a:r>
+              <a:rPr kumimoji="1" lang="zh-CN" altLang="en-US" dirty="0"/>
+              <a:t>选项</a:t>
+            </a:r>
+            <a:r>
+              <a:rPr kumimoji="1" lang="en-US" altLang="zh-CN" dirty="0"/>
+              <a:t>a</a:t>
+            </a:r>
+            <a:endParaRPr kumimoji="1" lang="zh-CN" altLang="en-US" dirty="0"/>
           </a:p>
         </p:txBody>
       </p:sp>
@@ -3693,10 +3561,73 @@
       </p:grpSp>
       <p:sp>
         <p:nvSpPr>
-          <p:cNvPr id="16" name="文本框 15">
+          <p:cNvPr id="12" name="燕尾形箭头 11">
+            <a:hlinkClick r:id="rId4" action="ppaction://hlinksldjump"/>
             <a:extLst>
               <a:ext uri="{FF2B5EF4-FFF2-40B4-BE49-F238E27FC236}">
-                <a16:creationId xmlns:a16="http://schemas.microsoft.com/office/drawing/2014/main" id="{635650C1-63AC-3BF5-CAE0-D51346CAA3D1}"/>
+                <a16:creationId xmlns:a16="http://schemas.microsoft.com/office/drawing/2014/main" id="{0C4791E6-82C0-A55F-1583-C9796639260A}"/>
+              </a:ext>
+            </a:extLst>
+          </p:cNvPr>
+          <p:cNvSpPr/>
+          <p:nvPr/>
+        </p:nvSpPr>
+        <p:spPr>
+          <a:xfrm flipH="1">
+            <a:off x="29094" y="70001"/>
+            <a:ext cx="465208" cy="450482"/>
+          </a:xfrm>
+          <a:prstGeom prst="notchedRightArrow">
+            <a:avLst/>
+          </a:prstGeom>
+          <a:solidFill>
+            <a:schemeClr val="accent1"/>
+          </a:solidFill>
+          <a:ln>
+            <a:noFill/>
+          </a:ln>
+        </p:spPr>
+        <p:style>
+          <a:lnRef idx="0">
+            <a:scrgbClr r="0" g="0" b="0"/>
+          </a:lnRef>
+          <a:fillRef idx="0">
+            <a:scrgbClr r="0" g="0" b="0"/>
+          </a:fillRef>
+          <a:effectRef idx="0">
+            <a:scrgbClr r="0" g="0" b="0"/>
+          </a:effectRef>
+          <a:fontRef idx="minor">
+            <a:schemeClr val="lt1"/>
+          </a:fontRef>
+        </p:style>
+        <p:txBody>
+          <a:bodyPr rtlCol="0" anchor="ctr"/>
+          <a:lstStyle/>
+          <a:p>
+            <a:pPr algn="ctr"/>
+            <a:endParaRPr kumimoji="1" lang="zh-CN" altLang="en-US">
+              <a:ln w="0"/>
+              <a:solidFill>
+                <a:schemeClr val="accent1"/>
+              </a:solidFill>
+              <a:effectLst>
+                <a:outerShdw blurRad="38100" dist="25400" dir="5400000" algn="ctr" rotWithShape="0">
+                  <a:srgbClr val="6E747A">
+                    <a:alpha val="43000"/>
+                  </a:srgbClr>
+                </a:outerShdw>
+              </a:effectLst>
+            </a:endParaRPr>
+          </a:p>
+        </p:txBody>
+      </p:sp>
+      <p:sp>
+        <p:nvSpPr>
+          <p:cNvPr id="13" name="文本框 12">
+            <a:extLst>
+              <a:ext uri="{FF2B5EF4-FFF2-40B4-BE49-F238E27FC236}">
+                <a16:creationId xmlns:a16="http://schemas.microsoft.com/office/drawing/2014/main" id="{BC8236FC-74AF-9EB4-6E1F-EA6A0BF8C1E3}"/>
               </a:ext>
             </a:extLst>
           </p:cNvPr>
@@ -3705,8 +3636,8 @@
         </p:nvSpPr>
         <p:spPr>
           <a:xfrm>
-            <a:off x="350344" y="3534065"/>
-            <a:ext cx="1872141" cy="369332"/>
+            <a:off x="0" y="3067128"/>
+            <a:ext cx="2519363" cy="369332"/>
           </a:xfrm>
           <a:prstGeom prst="rect">
             <a:avLst/>
@@ -3732,7 +3663,206 @@
           <a:p>
             <a:r>
               <a:rPr kumimoji="1" lang="zh-CN" altLang="en-US" dirty="0"/>
-              <a:t>测试结果已保存</a:t>
+              <a:t>选项</a:t>
+            </a:r>
+            <a:r>
+              <a:rPr kumimoji="1" lang="en-US" altLang="zh-CN" dirty="0"/>
+              <a:t>b</a:t>
+            </a:r>
+            <a:endParaRPr kumimoji="1" lang="zh-CN" altLang="en-US" dirty="0"/>
+          </a:p>
+        </p:txBody>
+      </p:sp>
+      <p:sp>
+        <p:nvSpPr>
+          <p:cNvPr id="14" name="文本框 13">
+            <a:extLst>
+              <a:ext uri="{FF2B5EF4-FFF2-40B4-BE49-F238E27FC236}">
+                <a16:creationId xmlns:a16="http://schemas.microsoft.com/office/drawing/2014/main" id="{922F65F1-8DC4-BD23-4E0B-016940F72731}"/>
+              </a:ext>
+            </a:extLst>
+          </p:cNvPr>
+          <p:cNvSpPr txBox="1"/>
+          <p:nvPr/>
+        </p:nvSpPr>
+        <p:spPr>
+          <a:xfrm>
+            <a:off x="29094" y="3511540"/>
+            <a:ext cx="2519363" cy="369332"/>
+          </a:xfrm>
+          <a:prstGeom prst="rect">
+            <a:avLst/>
+          </a:prstGeom>
+          <a:solidFill>
+            <a:srgbClr val="B993A0">
+              <a:alpha val="52834"/>
+            </a:srgbClr>
+          </a:solidFill>
+          <a:ln>
+            <a:solidFill>
+              <a:schemeClr val="bg2">
+                <a:lumMod val="90000"/>
+              </a:schemeClr>
+            </a:solidFill>
+          </a:ln>
+        </p:spPr>
+        <p:txBody>
+          <a:bodyPr wrap="square" rtlCol="0">
+            <a:spAutoFit/>
+          </a:bodyPr>
+          <a:lstStyle/>
+          <a:p>
+            <a:r>
+              <a:rPr kumimoji="1" lang="zh-CN" altLang="en-US" dirty="0"/>
+              <a:t>选项</a:t>
+            </a:r>
+            <a:r>
+              <a:rPr kumimoji="1" lang="en-US" altLang="zh-CN" dirty="0"/>
+              <a:t>c</a:t>
+            </a:r>
+            <a:endParaRPr kumimoji="1" lang="zh-CN" altLang="en-US" dirty="0"/>
+          </a:p>
+        </p:txBody>
+      </p:sp>
+      <p:sp>
+        <p:nvSpPr>
+          <p:cNvPr id="15" name="文本框 14">
+            <a:extLst>
+              <a:ext uri="{FF2B5EF4-FFF2-40B4-BE49-F238E27FC236}">
+                <a16:creationId xmlns:a16="http://schemas.microsoft.com/office/drawing/2014/main" id="{2318C478-FCB1-8806-64A6-06D7D5CB06A4}"/>
+              </a:ext>
+            </a:extLst>
+          </p:cNvPr>
+          <p:cNvSpPr txBox="1"/>
+          <p:nvPr/>
+        </p:nvSpPr>
+        <p:spPr>
+          <a:xfrm>
+            <a:off x="29094" y="3888917"/>
+            <a:ext cx="2519363" cy="369332"/>
+          </a:xfrm>
+          <a:prstGeom prst="rect">
+            <a:avLst/>
+          </a:prstGeom>
+          <a:solidFill>
+            <a:srgbClr val="B993A0">
+              <a:alpha val="52834"/>
+            </a:srgbClr>
+          </a:solidFill>
+          <a:ln>
+            <a:solidFill>
+              <a:schemeClr val="bg2">
+                <a:lumMod val="90000"/>
+              </a:schemeClr>
+            </a:solidFill>
+          </a:ln>
+        </p:spPr>
+        <p:txBody>
+          <a:bodyPr wrap="square" rtlCol="0">
+            <a:spAutoFit/>
+          </a:bodyPr>
+          <a:lstStyle/>
+          <a:p>
+            <a:r>
+              <a:rPr kumimoji="1" lang="zh-CN" altLang="en-US" dirty="0"/>
+              <a:t>选项</a:t>
+            </a:r>
+            <a:r>
+              <a:rPr kumimoji="1" lang="en-US" altLang="zh-CN" dirty="0"/>
+              <a:t>d</a:t>
+            </a:r>
+            <a:endParaRPr kumimoji="1" lang="zh-CN" altLang="en-US" dirty="0"/>
+          </a:p>
+        </p:txBody>
+      </p:sp>
+      <p:sp>
+        <p:nvSpPr>
+          <p:cNvPr id="16" name="文本框 15">
+            <a:extLst>
+              <a:ext uri="{FF2B5EF4-FFF2-40B4-BE49-F238E27FC236}">
+                <a16:creationId xmlns:a16="http://schemas.microsoft.com/office/drawing/2014/main" id="{635650C1-63AC-3BF5-CAE0-D51346CAA3D1}"/>
+              </a:ext>
+            </a:extLst>
+          </p:cNvPr>
+          <p:cNvSpPr txBox="1"/>
+          <p:nvPr/>
+        </p:nvSpPr>
+        <p:spPr>
+          <a:xfrm>
+            <a:off x="0" y="4408508"/>
+            <a:ext cx="868681" cy="369332"/>
+          </a:xfrm>
+          <a:prstGeom prst="rect">
+            <a:avLst/>
+          </a:prstGeom>
+          <a:solidFill>
+            <a:srgbClr val="B993A0">
+              <a:alpha val="52834"/>
+            </a:srgbClr>
+          </a:solidFill>
+          <a:ln>
+            <a:solidFill>
+              <a:schemeClr val="bg2">
+                <a:lumMod val="90000"/>
+              </a:schemeClr>
+            </a:solidFill>
+          </a:ln>
+        </p:spPr>
+        <p:txBody>
+          <a:bodyPr wrap="square" rtlCol="0">
+            <a:spAutoFit/>
+          </a:bodyPr>
+          <a:lstStyle/>
+          <a:p>
+            <a:r>
+              <a:rPr kumimoji="1" lang="zh-CN" altLang="en-US" dirty="0"/>
+              <a:t>上一题</a:t>
+            </a:r>
+          </a:p>
+        </p:txBody>
+      </p:sp>
+      <p:sp>
+        <p:nvSpPr>
+          <p:cNvPr id="17" name="文本框 16">
+            <a:extLst>
+              <a:ext uri="{FF2B5EF4-FFF2-40B4-BE49-F238E27FC236}">
+                <a16:creationId xmlns:a16="http://schemas.microsoft.com/office/drawing/2014/main" id="{3F131ECF-4E8A-5C46-547A-BB971FC925E9}"/>
+              </a:ext>
+            </a:extLst>
+          </p:cNvPr>
+          <p:cNvSpPr txBox="1"/>
+          <p:nvPr/>
+        </p:nvSpPr>
+        <p:spPr>
+          <a:xfrm>
+            <a:off x="1520362" y="4432821"/>
+            <a:ext cx="868681" cy="923330"/>
+          </a:xfrm>
+          <a:prstGeom prst="rect">
+            <a:avLst/>
+          </a:prstGeom>
+          <a:solidFill>
+            <a:srgbClr val="B993A0">
+              <a:alpha val="52834"/>
+            </a:srgbClr>
+          </a:solidFill>
+          <a:ln>
+            <a:solidFill>
+              <a:schemeClr val="bg2">
+                <a:lumMod val="90000"/>
+              </a:schemeClr>
+            </a:solidFill>
+          </a:ln>
+        </p:spPr>
+        <p:txBody>
+          <a:bodyPr wrap="square" rtlCol="0">
+            <a:spAutoFit/>
+          </a:bodyPr>
+          <a:lstStyle/>
+          <a:p>
+            <a:r>
+              <a:rPr kumimoji="1" lang="zh-CN" altLang="en-US" dirty="0"/>
+              <a:t>下一题（出结果）</a:t>
             </a:r>
           </a:p>
         </p:txBody>
@@ -3740,7 +3870,7 @@
     </p:spTree>
     <p:extLst>
       <p:ext uri="{BB962C8B-B14F-4D97-AF65-F5344CB8AC3E}">
-        <p14:creationId xmlns:p14="http://schemas.microsoft.com/office/powerpoint/2010/main" val="3665619837"/>
+        <p14:creationId xmlns:p14="http://schemas.microsoft.com/office/powerpoint/2010/main" val="1293702325"/>
       </p:ext>
     </p:extLst>
   </p:cSld>
@@ -3839,10 +3969,10 @@
       </p:sp>
       <p:sp>
         <p:nvSpPr>
-          <p:cNvPr id="2" name="文本框 1">
+          <p:cNvPr id="8" name="文本框 7">
             <a:extLst>
               <a:ext uri="{FF2B5EF4-FFF2-40B4-BE49-F238E27FC236}">
-                <a16:creationId xmlns:a16="http://schemas.microsoft.com/office/drawing/2014/main" id="{1560D9B2-1FCD-475F-3644-4345A3C8AD23}"/>
+                <a16:creationId xmlns:a16="http://schemas.microsoft.com/office/drawing/2014/main" id="{8C3C745E-54C4-118E-0E96-024A32762E39}"/>
               </a:ext>
             </a:extLst>
           </p:cNvPr>
@@ -3851,8 +3981,8 @@
         </p:nvSpPr>
         <p:spPr>
           <a:xfrm>
-            <a:off x="0" y="478856"/>
-            <a:ext cx="2519363" cy="369332"/>
+            <a:off x="29094" y="1886986"/>
+            <a:ext cx="2519363" cy="1200329"/>
           </a:xfrm>
           <a:prstGeom prst="rect">
             <a:avLst/>
@@ -3877,12 +4007,66 @@
           <a:lstStyle/>
           <a:p>
             <a:r>
+              <a:rPr kumimoji="1" lang="zh-CN" altLang="en-US" dirty="0"/>
+              <a:t>测试结果</a:t>
+            </a:r>
+            <a:endParaRPr kumimoji="1" lang="en-US" altLang="zh-CN" dirty="0"/>
+          </a:p>
+          <a:p>
+            <a:r>
+              <a:rPr kumimoji="1" lang="en-US" altLang="zh-CN" dirty="0"/>
+              <a:t>xxxxxxxxxxxxxxxxxxxxxxxxxxxxxxxxxxxxxxxxxxxxxxxxxxxxxxxxxxxxxxxxx</a:t>
+            </a:r>
+            <a:endParaRPr kumimoji="1" lang="zh-CN" altLang="en-US" dirty="0"/>
+          </a:p>
+        </p:txBody>
+      </p:sp>
+      <p:sp>
+        <p:nvSpPr>
+          <p:cNvPr id="2" name="文本框 1">
+            <a:extLst>
+              <a:ext uri="{FF2B5EF4-FFF2-40B4-BE49-F238E27FC236}">
+                <a16:creationId xmlns:a16="http://schemas.microsoft.com/office/drawing/2014/main" id="{1560D9B2-1FCD-475F-3644-4345A3C8AD23}"/>
+              </a:ext>
+            </a:extLst>
+          </p:cNvPr>
+          <p:cNvSpPr txBox="1"/>
+          <p:nvPr/>
+        </p:nvSpPr>
+        <p:spPr>
+          <a:xfrm>
+            <a:off x="0" y="478856"/>
+            <a:ext cx="2519363" cy="369332"/>
+          </a:xfrm>
+          <a:prstGeom prst="rect">
+            <a:avLst/>
+          </a:prstGeom>
+          <a:solidFill>
+            <a:srgbClr val="B993A0">
+              <a:alpha val="52834"/>
+            </a:srgbClr>
+          </a:solidFill>
+          <a:ln>
+            <a:solidFill>
+              <a:schemeClr val="bg2">
+                <a:lumMod val="90000"/>
+              </a:schemeClr>
+            </a:solidFill>
+          </a:ln>
+        </p:spPr>
+        <p:txBody>
+          <a:bodyPr wrap="square" rtlCol="0">
+            <a:spAutoFit/>
+          </a:bodyPr>
+          <a:lstStyle/>
+          <a:p>
+            <a:r>
               <a:rPr kumimoji="1" lang="en-US" altLang="zh-CN" dirty="0"/>
               <a:t>//</a:t>
             </a:r>
             <a:r>
               <a:rPr kumimoji="1" lang="zh-CN" altLang="en-US" dirty="0"/>
-              <a:t>配对页面</a:t>
+              <a:t>测试结果页面</a:t>
             </a:r>
           </a:p>
         </p:txBody>
@@ -4082,10 +4266,86 @@
       </p:grpSp>
       <p:sp>
         <p:nvSpPr>
-          <p:cNvPr id="3" name="矩形 2">
+          <p:cNvPr id="16" name="文本框 15">
             <a:extLst>
               <a:ext uri="{FF2B5EF4-FFF2-40B4-BE49-F238E27FC236}">
-                <a16:creationId xmlns:a16="http://schemas.microsoft.com/office/drawing/2014/main" id="{F912C6BE-669F-D645-81DA-BEDFCD5B91B7}"/>
+                <a16:creationId xmlns:a16="http://schemas.microsoft.com/office/drawing/2014/main" id="{635650C1-63AC-3BF5-CAE0-D51346CAA3D1}"/>
+              </a:ext>
+            </a:extLst>
+          </p:cNvPr>
+          <p:cNvSpPr txBox="1"/>
+          <p:nvPr/>
+        </p:nvSpPr>
+        <p:spPr>
+          <a:xfrm>
+            <a:off x="350344" y="3534065"/>
+            <a:ext cx="1872141" cy="369332"/>
+          </a:xfrm>
+          <a:prstGeom prst="rect">
+            <a:avLst/>
+          </a:prstGeom>
+          <a:solidFill>
+            <a:srgbClr val="B993A0">
+              <a:alpha val="52834"/>
+            </a:srgbClr>
+          </a:solidFill>
+          <a:ln>
+            <a:solidFill>
+              <a:schemeClr val="bg2">
+                <a:lumMod val="90000"/>
+              </a:schemeClr>
+            </a:solidFill>
+          </a:ln>
+        </p:spPr>
+        <p:txBody>
+          <a:bodyPr wrap="square" rtlCol="0">
+            <a:spAutoFit/>
+          </a:bodyPr>
+          <a:lstStyle/>
+          <a:p>
+            <a:r>
+              <a:rPr kumimoji="1" lang="zh-CN" altLang="en-US" dirty="0"/>
+              <a:t>测试结果已保存</a:t>
+            </a:r>
+          </a:p>
+        </p:txBody>
+      </p:sp>
+    </p:spTree>
+    <p:extLst>
+      <p:ext uri="{BB962C8B-B14F-4D97-AF65-F5344CB8AC3E}">
+        <p14:creationId xmlns:p14="http://schemas.microsoft.com/office/powerpoint/2010/main" val="3665619837"/>
+      </p:ext>
+    </p:extLst>
+  </p:cSld>
+  <p:clrMapOvr>
+    <a:masterClrMapping/>
+  </p:clrMapOvr>
+</p:sld>
+</file>
+
+<file path=ppt/slides/slide12.xml><?xml version="1.0" encoding="utf-8"?>
+<p:sld xmlns:a="http://schemas.openxmlformats.org/drawingml/2006/main" xmlns:r="http://schemas.openxmlformats.org/officeDocument/2006/relationships" xmlns:p="http://schemas.openxmlformats.org/presentationml/2006/main">
+  <p:cSld>
+    <p:spTree>
+      <p:nvGrpSpPr>
+        <p:cNvPr id="1" name=""/>
+        <p:cNvGrpSpPr/>
+        <p:nvPr/>
+      </p:nvGrpSpPr>
+      <p:grpSpPr>
+        <a:xfrm>
+          <a:off x="0" y="0"/>
+          <a:ext cx="0" cy="0"/>
+          <a:chOff x="0" y="0"/>
+          <a:chExt cx="0" cy="0"/>
+        </a:xfrm>
+      </p:grpSpPr>
+      <p:sp>
+        <p:nvSpPr>
+          <p:cNvPr id="5" name="矩形 4">
+            <a:extLst>
+              <a:ext uri="{FF2B5EF4-FFF2-40B4-BE49-F238E27FC236}">
+                <a16:creationId xmlns:a16="http://schemas.microsoft.com/office/drawing/2014/main" id="{8ECE4256-12CA-D143-2686-D16E16BCDE32}"/>
               </a:ext>
             </a:extLst>
           </p:cNvPr>
@@ -4094,8 +4354,8 @@
         </p:nvSpPr>
         <p:spPr>
           <a:xfrm>
-            <a:off x="498764" y="1197033"/>
-            <a:ext cx="1579418" cy="2186247"/>
+            <a:off x="0" y="0"/>
+            <a:ext cx="2519363" cy="1753985"/>
           </a:xfrm>
           <a:prstGeom prst="rect">
             <a:avLst/>
@@ -4152,10 +4412,10 @@
       </p:sp>
       <p:sp>
         <p:nvSpPr>
-          <p:cNvPr id="16" name="文本框 15">
+          <p:cNvPr id="2" name="文本框 1">
             <a:extLst>
               <a:ext uri="{FF2B5EF4-FFF2-40B4-BE49-F238E27FC236}">
-                <a16:creationId xmlns:a16="http://schemas.microsoft.com/office/drawing/2014/main" id="{635650C1-63AC-3BF5-CAE0-D51346CAA3D1}"/>
+                <a16:creationId xmlns:a16="http://schemas.microsoft.com/office/drawing/2014/main" id="{1560D9B2-1FCD-475F-3644-4345A3C8AD23}"/>
               </a:ext>
             </a:extLst>
           </p:cNvPr>
@@ -4164,8 +4424,8 @@
         </p:nvSpPr>
         <p:spPr>
           <a:xfrm>
-            <a:off x="740135" y="2762780"/>
-            <a:ext cx="1039091" cy="369332"/>
+            <a:off x="0" y="478856"/>
+            <a:ext cx="2519363" cy="369332"/>
           </a:xfrm>
           <a:prstGeom prst="rect">
             <a:avLst/>
@@ -4190,458 +4450,12 @@
           <a:lstStyle/>
           <a:p>
             <a:r>
-              <a:rPr kumimoji="1" lang="zh-CN" altLang="en-US" dirty="0"/>
-              <a:t>照片</a:t>
-            </a:r>
-          </a:p>
-        </p:txBody>
-      </p:sp>
-      <p:sp>
-        <p:nvSpPr>
-          <p:cNvPr id="4" name="椭圆 3">
-            <a:extLst>
-              <a:ext uri="{FF2B5EF4-FFF2-40B4-BE49-F238E27FC236}">
-                <a16:creationId xmlns:a16="http://schemas.microsoft.com/office/drawing/2014/main" id="{7BE42D41-B099-8066-2C54-F87F10F4ACA6}"/>
-              </a:ext>
-            </a:extLst>
-          </p:cNvPr>
-          <p:cNvSpPr/>
-          <p:nvPr/>
-        </p:nvSpPr>
-        <p:spPr>
-          <a:xfrm>
-            <a:off x="766868" y="1467778"/>
-            <a:ext cx="1039091" cy="1006989"/>
-          </a:xfrm>
-          <a:prstGeom prst="ellipse">
-            <a:avLst/>
-          </a:prstGeom>
-          <a:ln/>
-        </p:spPr>
-        <p:style>
-          <a:lnRef idx="2">
-            <a:schemeClr val="accent1"/>
-          </a:lnRef>
-          <a:fillRef idx="1">
-            <a:schemeClr val="lt1"/>
-          </a:fillRef>
-          <a:effectRef idx="0">
-            <a:schemeClr val="accent1"/>
-          </a:effectRef>
-          <a:fontRef idx="minor">
-            <a:schemeClr val="dk1"/>
-          </a:fontRef>
-        </p:style>
-        <p:txBody>
-          <a:bodyPr rtlCol="0" anchor="ctr"/>
-          <a:lstStyle/>
-          <a:p>
-            <a:pPr algn="ctr"/>
-            <a:endParaRPr kumimoji="1" lang="zh-CN" altLang="en-US"/>
-          </a:p>
-        </p:txBody>
-      </p:sp>
-      <p:sp>
-        <p:nvSpPr>
-          <p:cNvPr id="12" name="矩形 11">
-            <a:extLst>
-              <a:ext uri="{FF2B5EF4-FFF2-40B4-BE49-F238E27FC236}">
-                <a16:creationId xmlns:a16="http://schemas.microsoft.com/office/drawing/2014/main" id="{8CBA0715-F8C1-2D5E-83DC-CE9CDD98E620}"/>
-              </a:ext>
-            </a:extLst>
-          </p:cNvPr>
-          <p:cNvSpPr/>
-          <p:nvPr/>
-        </p:nvSpPr>
-        <p:spPr>
-          <a:xfrm>
-            <a:off x="58190" y="3340158"/>
-            <a:ext cx="2461173" cy="1490836"/>
-          </a:xfrm>
-          <a:prstGeom prst="rect">
-            <a:avLst/>
-          </a:prstGeom>
-          <a:gradFill>
-            <a:gsLst>
-              <a:gs pos="100000">
-                <a:srgbClr val="B993A0">
-                  <a:alpha val="0"/>
-                </a:srgbClr>
-              </a:gs>
-              <a:gs pos="91000">
-                <a:srgbClr val="B993A0">
-                  <a:alpha val="70000"/>
-                </a:srgbClr>
-              </a:gs>
-              <a:gs pos="0">
-                <a:srgbClr val="B993A0"/>
-              </a:gs>
-              <a:gs pos="51000">
-                <a:srgbClr val="B993A0"/>
-              </a:gs>
-            </a:gsLst>
-            <a:lin ang="5400000" scaled="1"/>
-          </a:gradFill>
-          <a:ln>
-            <a:noFill/>
-          </a:ln>
-        </p:spPr>
-        <p:style>
-          <a:lnRef idx="2">
-            <a:schemeClr val="accent1">
-              <a:shade val="50000"/>
-            </a:schemeClr>
-          </a:lnRef>
-          <a:fillRef idx="1">
-            <a:schemeClr val="accent1"/>
-          </a:fillRef>
-          <a:effectRef idx="0">
-            <a:schemeClr val="accent1"/>
-          </a:effectRef>
-          <a:fontRef idx="minor">
-            <a:schemeClr val="lt1"/>
-          </a:fontRef>
-        </p:style>
-        <p:txBody>
-          <a:bodyPr rtlCol="0" anchor="ctr"/>
-          <a:lstStyle/>
-          <a:p>
-            <a:pPr algn="ctr"/>
-            <a:r>
-              <a:rPr kumimoji="1" lang="zh-CN" altLang="en-US" dirty="0"/>
-              <a:t>个人信息</a:t>
-            </a:r>
-          </a:p>
-        </p:txBody>
-      </p:sp>
-      <p:sp>
-        <p:nvSpPr>
-          <p:cNvPr id="13" name="左箭头 12">
-            <a:extLst>
-              <a:ext uri="{FF2B5EF4-FFF2-40B4-BE49-F238E27FC236}">
-                <a16:creationId xmlns:a16="http://schemas.microsoft.com/office/drawing/2014/main" id="{F5062AF8-D5FC-B9CD-87B9-7175A5D33A95}"/>
-              </a:ext>
-            </a:extLst>
-          </p:cNvPr>
-          <p:cNvSpPr/>
-          <p:nvPr/>
-        </p:nvSpPr>
-        <p:spPr>
-          <a:xfrm>
-            <a:off x="0" y="2762780"/>
-            <a:ext cx="224444" cy="184666"/>
-          </a:xfrm>
-          <a:prstGeom prst="leftArrow">
-            <a:avLst/>
-          </a:prstGeom>
-          <a:gradFill>
-            <a:gsLst>
-              <a:gs pos="100000">
-                <a:srgbClr val="B993A0">
-                  <a:alpha val="0"/>
-                </a:srgbClr>
-              </a:gs>
-              <a:gs pos="91000">
-                <a:srgbClr val="B993A0">
-                  <a:alpha val="70000"/>
-                </a:srgbClr>
-              </a:gs>
-              <a:gs pos="0">
-                <a:srgbClr val="B993A0"/>
-              </a:gs>
-              <a:gs pos="51000">
-                <a:srgbClr val="B993A0"/>
-              </a:gs>
-            </a:gsLst>
-            <a:lin ang="5400000" scaled="1"/>
-          </a:gradFill>
-          <a:ln>
-            <a:noFill/>
-          </a:ln>
-        </p:spPr>
-        <p:style>
-          <a:lnRef idx="2">
-            <a:schemeClr val="accent1">
-              <a:shade val="50000"/>
-            </a:schemeClr>
-          </a:lnRef>
-          <a:fillRef idx="1">
-            <a:schemeClr val="accent1"/>
-          </a:fillRef>
-          <a:effectRef idx="0">
-            <a:schemeClr val="accent1"/>
-          </a:effectRef>
-          <a:fontRef idx="minor">
-            <a:schemeClr val="lt1"/>
-          </a:fontRef>
-        </p:style>
-        <p:txBody>
-          <a:bodyPr rtlCol="0" anchor="ctr"/>
-          <a:lstStyle/>
-          <a:p>
-            <a:pPr algn="ctr"/>
-            <a:endParaRPr kumimoji="1" lang="zh-CN" altLang="en-US"/>
-          </a:p>
-        </p:txBody>
-      </p:sp>
-      <p:sp>
-        <p:nvSpPr>
-          <p:cNvPr id="14" name="左箭头 13">
-            <a:extLst>
-              <a:ext uri="{FF2B5EF4-FFF2-40B4-BE49-F238E27FC236}">
-                <a16:creationId xmlns:a16="http://schemas.microsoft.com/office/drawing/2014/main" id="{91131D1C-9462-0B39-9A40-9FBD816CB304}"/>
-              </a:ext>
-            </a:extLst>
-          </p:cNvPr>
-          <p:cNvSpPr/>
-          <p:nvPr/>
-        </p:nvSpPr>
-        <p:spPr>
-          <a:xfrm flipH="1">
-            <a:off x="2253356" y="2762780"/>
-            <a:ext cx="236912" cy="224649"/>
-          </a:xfrm>
-          <a:prstGeom prst="leftArrow">
-            <a:avLst/>
-          </a:prstGeom>
-          <a:gradFill>
-            <a:gsLst>
-              <a:gs pos="100000">
-                <a:srgbClr val="B993A0">
-                  <a:alpha val="0"/>
-                </a:srgbClr>
-              </a:gs>
-              <a:gs pos="91000">
-                <a:srgbClr val="B993A0">
-                  <a:alpha val="70000"/>
-                </a:srgbClr>
-              </a:gs>
-              <a:gs pos="0">
-                <a:srgbClr val="B993A0"/>
-              </a:gs>
-              <a:gs pos="51000">
-                <a:srgbClr val="B993A0"/>
-              </a:gs>
-            </a:gsLst>
-            <a:lin ang="5400000" scaled="1"/>
-          </a:gradFill>
-          <a:ln>
-            <a:noFill/>
-          </a:ln>
-        </p:spPr>
-        <p:style>
-          <a:lnRef idx="2">
-            <a:schemeClr val="accent1">
-              <a:shade val="50000"/>
-            </a:schemeClr>
-          </a:lnRef>
-          <a:fillRef idx="1">
-            <a:schemeClr val="accent1"/>
-          </a:fillRef>
-          <a:effectRef idx="0">
-            <a:schemeClr val="accent1"/>
-          </a:effectRef>
-          <a:fontRef idx="minor">
-            <a:schemeClr val="lt1"/>
-          </a:fontRef>
-        </p:style>
-        <p:txBody>
-          <a:bodyPr rtlCol="0" anchor="ctr"/>
-          <a:lstStyle/>
-          <a:p>
-            <a:pPr algn="ctr"/>
-            <a:endParaRPr kumimoji="1" lang="zh-CN" altLang="en-US"/>
-          </a:p>
-        </p:txBody>
-      </p:sp>
-      <p:sp>
-        <p:nvSpPr>
-          <p:cNvPr id="15" name="文本框 14">
-            <a:extLst>
-              <a:ext uri="{FF2B5EF4-FFF2-40B4-BE49-F238E27FC236}">
-                <a16:creationId xmlns:a16="http://schemas.microsoft.com/office/drawing/2014/main" id="{7CCE92E8-6CB9-BA74-5E59-38A1563570FC}"/>
-              </a:ext>
-            </a:extLst>
-          </p:cNvPr>
-          <p:cNvSpPr txBox="1"/>
-          <p:nvPr/>
-        </p:nvSpPr>
-        <p:spPr>
-          <a:xfrm>
-            <a:off x="1286413" y="83530"/>
-            <a:ext cx="1338828" cy="646331"/>
-          </a:xfrm>
-          <a:prstGeom prst="rect">
-            <a:avLst/>
-          </a:prstGeom>
-          <a:noFill/>
-        </p:spPr>
-        <p:txBody>
-          <a:bodyPr wrap="none" rtlCol="0">
-            <a:spAutoFit/>
-          </a:bodyPr>
-          <a:lstStyle/>
-          <a:p>
-            <a:r>
-              <a:rPr kumimoji="1" lang="zh-CN" altLang="en-US" dirty="0"/>
-              <a:t>左滑不喜欢</a:t>
-            </a:r>
-            <a:endParaRPr kumimoji="1" lang="en-US" altLang="zh-CN" dirty="0"/>
-          </a:p>
-          <a:p>
-            <a:r>
-              <a:rPr kumimoji="1" lang="zh-CN" altLang="en-US" dirty="0"/>
-              <a:t>右滑喜欢</a:t>
-            </a:r>
-          </a:p>
-        </p:txBody>
-      </p:sp>
-    </p:spTree>
-    <p:extLst>
-      <p:ext uri="{BB962C8B-B14F-4D97-AF65-F5344CB8AC3E}">
-        <p14:creationId xmlns:p14="http://schemas.microsoft.com/office/powerpoint/2010/main" val="4278715240"/>
-      </p:ext>
-    </p:extLst>
-  </p:cSld>
-  <p:clrMapOvr>
-    <a:masterClrMapping/>
-  </p:clrMapOvr>
-</p:sld>
-</file>
-
-<file path=ppt/slides/slide12.xml><?xml version="1.0" encoding="utf-8"?>
-<p:sld xmlns:a="http://schemas.openxmlformats.org/drawingml/2006/main" xmlns:r="http://schemas.openxmlformats.org/officeDocument/2006/relationships" xmlns:p="http://schemas.openxmlformats.org/presentationml/2006/main">
-  <p:cSld>
-    <p:spTree>
-      <p:nvGrpSpPr>
-        <p:cNvPr id="1" name=""/>
-        <p:cNvGrpSpPr/>
-        <p:nvPr/>
-      </p:nvGrpSpPr>
-      <p:grpSpPr>
-        <a:xfrm>
-          <a:off x="0" y="0"/>
-          <a:ext cx="0" cy="0"/>
-          <a:chOff x="0" y="0"/>
-          <a:chExt cx="0" cy="0"/>
-        </a:xfrm>
-      </p:grpSpPr>
-      <p:sp>
-        <p:nvSpPr>
-          <p:cNvPr id="5" name="矩形 4">
-            <a:extLst>
-              <a:ext uri="{FF2B5EF4-FFF2-40B4-BE49-F238E27FC236}">
-                <a16:creationId xmlns:a16="http://schemas.microsoft.com/office/drawing/2014/main" id="{8ECE4256-12CA-D143-2686-D16E16BCDE32}"/>
-              </a:ext>
-            </a:extLst>
-          </p:cNvPr>
-          <p:cNvSpPr/>
-          <p:nvPr/>
-        </p:nvSpPr>
-        <p:spPr>
-          <a:xfrm>
-            <a:off x="0" y="0"/>
-            <a:ext cx="2519363" cy="1753985"/>
-          </a:xfrm>
-          <a:prstGeom prst="rect">
-            <a:avLst/>
-          </a:prstGeom>
-          <a:gradFill>
-            <a:gsLst>
-              <a:gs pos="100000">
-                <a:srgbClr val="B993A0">
-                  <a:alpha val="0"/>
-                </a:srgbClr>
-              </a:gs>
-              <a:gs pos="91000">
-                <a:srgbClr val="B993A0">
-                  <a:alpha val="70000"/>
-                </a:srgbClr>
-              </a:gs>
-              <a:gs pos="0">
-                <a:srgbClr val="B993A0"/>
-              </a:gs>
-              <a:gs pos="51000">
-                <a:srgbClr val="B993A0"/>
-              </a:gs>
-            </a:gsLst>
-            <a:lin ang="5400000" scaled="1"/>
-          </a:gradFill>
-          <a:ln>
-            <a:noFill/>
-          </a:ln>
-        </p:spPr>
-        <p:style>
-          <a:lnRef idx="2">
-            <a:schemeClr val="accent1">
-              <a:shade val="50000"/>
-            </a:schemeClr>
-          </a:lnRef>
-          <a:fillRef idx="1">
-            <a:schemeClr val="accent1"/>
-          </a:fillRef>
-          <a:effectRef idx="0">
-            <a:schemeClr val="accent1"/>
-          </a:effectRef>
-          <a:fontRef idx="minor">
-            <a:schemeClr val="lt1"/>
-          </a:fontRef>
-        </p:style>
-        <p:txBody>
-          <a:bodyPr rtlCol="0" anchor="ctr"/>
-          <a:lstStyle/>
-          <a:p>
-            <a:pPr algn="ctr"/>
-            <a:endParaRPr kumimoji="1" lang="zh-CN" altLang="en-US" dirty="0"/>
-          </a:p>
-        </p:txBody>
-      </p:sp>
-      <p:sp>
-        <p:nvSpPr>
-          <p:cNvPr id="2" name="文本框 1">
-            <a:extLst>
-              <a:ext uri="{FF2B5EF4-FFF2-40B4-BE49-F238E27FC236}">
-                <a16:creationId xmlns:a16="http://schemas.microsoft.com/office/drawing/2014/main" id="{1560D9B2-1FCD-475F-3644-4345A3C8AD23}"/>
-              </a:ext>
-            </a:extLst>
-          </p:cNvPr>
-          <p:cNvSpPr txBox="1"/>
-          <p:nvPr/>
-        </p:nvSpPr>
-        <p:spPr>
-          <a:xfrm>
-            <a:off x="0" y="478856"/>
-            <a:ext cx="2519363" cy="369332"/>
-          </a:xfrm>
-          <a:prstGeom prst="rect">
-            <a:avLst/>
-          </a:prstGeom>
-          <a:solidFill>
-            <a:srgbClr val="B993A0">
-              <a:alpha val="52834"/>
-            </a:srgbClr>
-          </a:solidFill>
-          <a:ln>
-            <a:solidFill>
-              <a:schemeClr val="bg2">
-                <a:lumMod val="90000"/>
-              </a:schemeClr>
-            </a:solidFill>
-          </a:ln>
-        </p:spPr>
-        <p:txBody>
-          <a:bodyPr wrap="square" rtlCol="0">
-            <a:spAutoFit/>
-          </a:bodyPr>
-          <a:lstStyle/>
-          <a:p>
-            <a:r>
               <a:rPr kumimoji="1" lang="en-US" altLang="zh-CN" dirty="0"/>
               <a:t>//</a:t>
             </a:r>
             <a:r>
               <a:rPr kumimoji="1" lang="zh-CN" altLang="en-US" dirty="0"/>
-              <a:t>我的配对页面</a:t>
+              <a:t>配对页面</a:t>
             </a:r>
           </a:p>
         </p:txBody>
@@ -4841,56 +4655,10 @@
       </p:grpSp>
       <p:sp>
         <p:nvSpPr>
-          <p:cNvPr id="16" name="文本框 15">
+          <p:cNvPr id="3" name="矩形 2">
             <a:extLst>
               <a:ext uri="{FF2B5EF4-FFF2-40B4-BE49-F238E27FC236}">
-                <a16:creationId xmlns:a16="http://schemas.microsoft.com/office/drawing/2014/main" id="{635650C1-63AC-3BF5-CAE0-D51346CAA3D1}"/>
-              </a:ext>
-            </a:extLst>
-          </p:cNvPr>
-          <p:cNvSpPr txBox="1"/>
-          <p:nvPr/>
-        </p:nvSpPr>
-        <p:spPr>
-          <a:xfrm>
-            <a:off x="160039" y="2564130"/>
-            <a:ext cx="1039091" cy="646331"/>
-          </a:xfrm>
-          <a:prstGeom prst="rect">
-            <a:avLst/>
-          </a:prstGeom>
-          <a:solidFill>
-            <a:srgbClr val="B993A0">
-              <a:alpha val="52834"/>
-            </a:srgbClr>
-          </a:solidFill>
-          <a:ln>
-            <a:solidFill>
-              <a:schemeClr val="bg2">
-                <a:lumMod val="90000"/>
-              </a:schemeClr>
-            </a:solidFill>
-          </a:ln>
-        </p:spPr>
-        <p:txBody>
-          <a:bodyPr wrap="square" rtlCol="0">
-            <a:spAutoFit/>
-          </a:bodyPr>
-          <a:lstStyle/>
-          <a:p>
-            <a:r>
-              <a:rPr kumimoji="1" lang="zh-CN" altLang="en-US" dirty="0"/>
-              <a:t>名字， 年龄</a:t>
-            </a:r>
-          </a:p>
-        </p:txBody>
-      </p:sp>
-      <p:sp>
-        <p:nvSpPr>
-          <p:cNvPr id="4" name="椭圆 3">
-            <a:extLst>
-              <a:ext uri="{FF2B5EF4-FFF2-40B4-BE49-F238E27FC236}">
-                <a16:creationId xmlns:a16="http://schemas.microsoft.com/office/drawing/2014/main" id="{7BE42D41-B099-8066-2C54-F87F10F4ACA6}"/>
+                <a16:creationId xmlns:a16="http://schemas.microsoft.com/office/drawing/2014/main" id="{F912C6BE-669F-D645-81DA-BEDFCD5B91B7}"/>
               </a:ext>
             </a:extLst>
           </p:cNvPr>
@@ -4899,265 +4667,8 @@
         </p:nvSpPr>
         <p:spPr>
           <a:xfrm>
-            <a:off x="160039" y="1513627"/>
-            <a:ext cx="1039091" cy="1006989"/>
-          </a:xfrm>
-          <a:prstGeom prst="ellipse">
-            <a:avLst/>
-          </a:prstGeom>
-          <a:ln/>
-        </p:spPr>
-        <p:style>
-          <a:lnRef idx="2">
-            <a:schemeClr val="accent1"/>
-          </a:lnRef>
-          <a:fillRef idx="1">
-            <a:schemeClr val="lt1"/>
-          </a:fillRef>
-          <a:effectRef idx="0">
-            <a:schemeClr val="accent1"/>
-          </a:effectRef>
-          <a:fontRef idx="minor">
-            <a:schemeClr val="dk1"/>
-          </a:fontRef>
-        </p:style>
-        <p:txBody>
-          <a:bodyPr rtlCol="0" anchor="ctr"/>
-          <a:lstStyle/>
-          <a:p>
-            <a:pPr algn="ctr"/>
-            <a:endParaRPr kumimoji="1" lang="zh-CN" altLang="en-US"/>
-          </a:p>
-        </p:txBody>
-      </p:sp>
-      <p:sp>
-        <p:nvSpPr>
-          <p:cNvPr id="6" name="文本框 5">
-            <a:extLst>
-              <a:ext uri="{FF2B5EF4-FFF2-40B4-BE49-F238E27FC236}">
-                <a16:creationId xmlns:a16="http://schemas.microsoft.com/office/drawing/2014/main" id="{3CB6ED12-E2A6-D97C-C8EE-A6F9EAFEE666}"/>
-              </a:ext>
-            </a:extLst>
-          </p:cNvPr>
-          <p:cNvSpPr txBox="1"/>
-          <p:nvPr/>
-        </p:nvSpPr>
-        <p:spPr>
-          <a:xfrm>
-            <a:off x="1259681" y="2586797"/>
-            <a:ext cx="1039091" cy="646331"/>
-          </a:xfrm>
-          <a:prstGeom prst="rect">
-            <a:avLst/>
-          </a:prstGeom>
-          <a:solidFill>
-            <a:srgbClr val="B993A0">
-              <a:alpha val="52834"/>
-            </a:srgbClr>
-          </a:solidFill>
-          <a:ln>
-            <a:solidFill>
-              <a:schemeClr val="bg2">
-                <a:lumMod val="90000"/>
-              </a:schemeClr>
-            </a:solidFill>
-          </a:ln>
-        </p:spPr>
-        <p:txBody>
-          <a:bodyPr wrap="square" rtlCol="0">
-            <a:spAutoFit/>
-          </a:bodyPr>
-          <a:lstStyle/>
-          <a:p>
-            <a:r>
-              <a:rPr kumimoji="1" lang="zh-CN" altLang="en-US" dirty="0"/>
-              <a:t>名字， 年龄</a:t>
-            </a:r>
-          </a:p>
-        </p:txBody>
-      </p:sp>
-      <p:sp>
-        <p:nvSpPr>
-          <p:cNvPr id="8" name="椭圆 7">
-            <a:extLst>
-              <a:ext uri="{FF2B5EF4-FFF2-40B4-BE49-F238E27FC236}">
-                <a16:creationId xmlns:a16="http://schemas.microsoft.com/office/drawing/2014/main" id="{C2B4DE7E-C9EB-6DDE-0862-9BDD15FCA829}"/>
-              </a:ext>
-            </a:extLst>
-          </p:cNvPr>
-          <p:cNvSpPr/>
-          <p:nvPr/>
-        </p:nvSpPr>
-        <p:spPr>
-          <a:xfrm>
-            <a:off x="1259681" y="1536294"/>
-            <a:ext cx="1039091" cy="1006989"/>
-          </a:xfrm>
-          <a:prstGeom prst="ellipse">
-            <a:avLst/>
-          </a:prstGeom>
-          <a:ln/>
-        </p:spPr>
-        <p:style>
-          <a:lnRef idx="2">
-            <a:schemeClr val="accent1"/>
-          </a:lnRef>
-          <a:fillRef idx="1">
-            <a:schemeClr val="lt1"/>
-          </a:fillRef>
-          <a:effectRef idx="0">
-            <a:schemeClr val="accent1"/>
-          </a:effectRef>
-          <a:fontRef idx="minor">
-            <a:schemeClr val="dk1"/>
-          </a:fontRef>
-        </p:style>
-        <p:txBody>
-          <a:bodyPr rtlCol="0" anchor="ctr"/>
-          <a:lstStyle/>
-          <a:p>
-            <a:pPr algn="ctr"/>
-            <a:endParaRPr kumimoji="1" lang="zh-CN" altLang="en-US"/>
-          </a:p>
-        </p:txBody>
-      </p:sp>
-      <p:sp>
-        <p:nvSpPr>
-          <p:cNvPr id="17" name="文本框 16">
-            <a:extLst>
-              <a:ext uri="{FF2B5EF4-FFF2-40B4-BE49-F238E27FC236}">
-                <a16:creationId xmlns:a16="http://schemas.microsoft.com/office/drawing/2014/main" id="{BA16E675-81F9-2DA3-12C7-59F4995A3CB3}"/>
-              </a:ext>
-            </a:extLst>
-          </p:cNvPr>
-          <p:cNvSpPr txBox="1"/>
-          <p:nvPr/>
-        </p:nvSpPr>
-        <p:spPr>
-          <a:xfrm>
-            <a:off x="261480" y="4228658"/>
-            <a:ext cx="1039091" cy="646331"/>
-          </a:xfrm>
-          <a:prstGeom prst="rect">
-            <a:avLst/>
-          </a:prstGeom>
-          <a:solidFill>
-            <a:srgbClr val="B993A0">
-              <a:alpha val="52834"/>
-            </a:srgbClr>
-          </a:solidFill>
-          <a:ln>
-            <a:solidFill>
-              <a:schemeClr val="bg2">
-                <a:lumMod val="90000"/>
-              </a:schemeClr>
-            </a:solidFill>
-          </a:ln>
-        </p:spPr>
-        <p:txBody>
-          <a:bodyPr wrap="square" rtlCol="0">
-            <a:spAutoFit/>
-          </a:bodyPr>
-          <a:lstStyle/>
-          <a:p>
-            <a:r>
-              <a:rPr kumimoji="1" lang="zh-CN" altLang="en-US" dirty="0"/>
-              <a:t>名字， 年龄</a:t>
-            </a:r>
-          </a:p>
-        </p:txBody>
-      </p:sp>
-      <p:sp>
-        <p:nvSpPr>
-          <p:cNvPr id="18" name="椭圆 17">
-            <a:extLst>
-              <a:ext uri="{FF2B5EF4-FFF2-40B4-BE49-F238E27FC236}">
-                <a16:creationId xmlns:a16="http://schemas.microsoft.com/office/drawing/2014/main" id="{417B3A73-D39D-2BF7-E609-156B305AEFFB}"/>
-              </a:ext>
-            </a:extLst>
-          </p:cNvPr>
-          <p:cNvSpPr/>
-          <p:nvPr/>
-        </p:nvSpPr>
-        <p:spPr>
-          <a:xfrm>
-            <a:off x="261480" y="3178155"/>
-            <a:ext cx="1039091" cy="1006989"/>
-          </a:xfrm>
-          <a:prstGeom prst="ellipse">
-            <a:avLst/>
-          </a:prstGeom>
-          <a:ln/>
-        </p:spPr>
-        <p:style>
-          <a:lnRef idx="2">
-            <a:schemeClr val="accent1"/>
-          </a:lnRef>
-          <a:fillRef idx="1">
-            <a:schemeClr val="lt1"/>
-          </a:fillRef>
-          <a:effectRef idx="0">
-            <a:schemeClr val="accent1"/>
-          </a:effectRef>
-          <a:fontRef idx="minor">
-            <a:schemeClr val="dk1"/>
-          </a:fontRef>
-        </p:style>
-        <p:txBody>
-          <a:bodyPr rtlCol="0" anchor="ctr"/>
-          <a:lstStyle/>
-          <a:p>
-            <a:pPr algn="ctr"/>
-            <a:endParaRPr kumimoji="1" lang="zh-CN" altLang="en-US"/>
-          </a:p>
-        </p:txBody>
-      </p:sp>
-    </p:spTree>
-    <p:extLst>
-      <p:ext uri="{BB962C8B-B14F-4D97-AF65-F5344CB8AC3E}">
-        <p14:creationId xmlns:p14="http://schemas.microsoft.com/office/powerpoint/2010/main" val="2594591611"/>
-      </p:ext>
-    </p:extLst>
-  </p:cSld>
-  <p:clrMapOvr>
-    <a:masterClrMapping/>
-  </p:clrMapOvr>
-</p:sld>
-</file>
-
-<file path=ppt/slides/slide13.xml><?xml version="1.0" encoding="utf-8"?>
-<p:sld xmlns:a="http://schemas.openxmlformats.org/drawingml/2006/main" xmlns:r="http://schemas.openxmlformats.org/officeDocument/2006/relationships" xmlns:p="http://schemas.openxmlformats.org/presentationml/2006/main">
-  <p:cSld>
-    <p:spTree>
-      <p:nvGrpSpPr>
-        <p:cNvPr id="1" name=""/>
-        <p:cNvGrpSpPr/>
-        <p:nvPr/>
-      </p:nvGrpSpPr>
-      <p:grpSpPr>
-        <a:xfrm>
-          <a:off x="0" y="0"/>
-          <a:ext cx="0" cy="0"/>
-          <a:chOff x="0" y="0"/>
-          <a:chExt cx="0" cy="0"/>
-        </a:xfrm>
-      </p:grpSpPr>
-      <p:sp>
-        <p:nvSpPr>
-          <p:cNvPr id="5" name="矩形 4">
-            <a:extLst>
-              <a:ext uri="{FF2B5EF4-FFF2-40B4-BE49-F238E27FC236}">
-                <a16:creationId xmlns:a16="http://schemas.microsoft.com/office/drawing/2014/main" id="{8ECE4256-12CA-D143-2686-D16E16BCDE32}"/>
-              </a:ext>
-            </a:extLst>
-          </p:cNvPr>
-          <p:cNvSpPr/>
-          <p:nvPr/>
-        </p:nvSpPr>
-        <p:spPr>
-          <a:xfrm>
-            <a:off x="0" y="0"/>
-            <a:ext cx="2519363" cy="1753985"/>
+            <a:off x="498764" y="1197033"/>
+            <a:ext cx="1579418" cy="2186247"/>
           </a:xfrm>
           <a:prstGeom prst="rect">
             <a:avLst/>
@@ -5214,10 +4725,10 @@
       </p:sp>
       <p:sp>
         <p:nvSpPr>
-          <p:cNvPr id="2" name="文本框 1">
+          <p:cNvPr id="16" name="文本框 15">
             <a:extLst>
               <a:ext uri="{FF2B5EF4-FFF2-40B4-BE49-F238E27FC236}">
-                <a16:creationId xmlns:a16="http://schemas.microsoft.com/office/drawing/2014/main" id="{1560D9B2-1FCD-475F-3644-4345A3C8AD23}"/>
+                <a16:creationId xmlns:a16="http://schemas.microsoft.com/office/drawing/2014/main" id="{635650C1-63AC-3BF5-CAE0-D51346CAA3D1}"/>
               </a:ext>
             </a:extLst>
           </p:cNvPr>
@@ -5226,8 +4737,8 @@
         </p:nvSpPr>
         <p:spPr>
           <a:xfrm>
-            <a:off x="0" y="478856"/>
-            <a:ext cx="2519363" cy="646331"/>
+            <a:off x="740135" y="2762780"/>
+            <a:ext cx="1039091" cy="369332"/>
           </a:xfrm>
           <a:prstGeom prst="rect">
             <a:avLst/>
@@ -5252,12 +4763,458 @@
           <a:lstStyle/>
           <a:p>
             <a:r>
+              <a:rPr kumimoji="1" lang="zh-CN" altLang="en-US" dirty="0"/>
+              <a:t>照片</a:t>
+            </a:r>
+          </a:p>
+        </p:txBody>
+      </p:sp>
+      <p:sp>
+        <p:nvSpPr>
+          <p:cNvPr id="4" name="椭圆 3">
+            <a:extLst>
+              <a:ext uri="{FF2B5EF4-FFF2-40B4-BE49-F238E27FC236}">
+                <a16:creationId xmlns:a16="http://schemas.microsoft.com/office/drawing/2014/main" id="{7BE42D41-B099-8066-2C54-F87F10F4ACA6}"/>
+              </a:ext>
+            </a:extLst>
+          </p:cNvPr>
+          <p:cNvSpPr/>
+          <p:nvPr/>
+        </p:nvSpPr>
+        <p:spPr>
+          <a:xfrm>
+            <a:off x="766868" y="1467778"/>
+            <a:ext cx="1039091" cy="1006989"/>
+          </a:xfrm>
+          <a:prstGeom prst="ellipse">
+            <a:avLst/>
+          </a:prstGeom>
+          <a:ln/>
+        </p:spPr>
+        <p:style>
+          <a:lnRef idx="2">
+            <a:schemeClr val="accent1"/>
+          </a:lnRef>
+          <a:fillRef idx="1">
+            <a:schemeClr val="lt1"/>
+          </a:fillRef>
+          <a:effectRef idx="0">
+            <a:schemeClr val="accent1"/>
+          </a:effectRef>
+          <a:fontRef idx="minor">
+            <a:schemeClr val="dk1"/>
+          </a:fontRef>
+        </p:style>
+        <p:txBody>
+          <a:bodyPr rtlCol="0" anchor="ctr"/>
+          <a:lstStyle/>
+          <a:p>
+            <a:pPr algn="ctr"/>
+            <a:endParaRPr kumimoji="1" lang="zh-CN" altLang="en-US"/>
+          </a:p>
+        </p:txBody>
+      </p:sp>
+      <p:sp>
+        <p:nvSpPr>
+          <p:cNvPr id="12" name="矩形 11">
+            <a:extLst>
+              <a:ext uri="{FF2B5EF4-FFF2-40B4-BE49-F238E27FC236}">
+                <a16:creationId xmlns:a16="http://schemas.microsoft.com/office/drawing/2014/main" id="{8CBA0715-F8C1-2D5E-83DC-CE9CDD98E620}"/>
+              </a:ext>
+            </a:extLst>
+          </p:cNvPr>
+          <p:cNvSpPr/>
+          <p:nvPr/>
+        </p:nvSpPr>
+        <p:spPr>
+          <a:xfrm>
+            <a:off x="58190" y="3340158"/>
+            <a:ext cx="2461173" cy="1490836"/>
+          </a:xfrm>
+          <a:prstGeom prst="rect">
+            <a:avLst/>
+          </a:prstGeom>
+          <a:gradFill>
+            <a:gsLst>
+              <a:gs pos="100000">
+                <a:srgbClr val="B993A0">
+                  <a:alpha val="0"/>
+                </a:srgbClr>
+              </a:gs>
+              <a:gs pos="91000">
+                <a:srgbClr val="B993A0">
+                  <a:alpha val="70000"/>
+                </a:srgbClr>
+              </a:gs>
+              <a:gs pos="0">
+                <a:srgbClr val="B993A0"/>
+              </a:gs>
+              <a:gs pos="51000">
+                <a:srgbClr val="B993A0"/>
+              </a:gs>
+            </a:gsLst>
+            <a:lin ang="5400000" scaled="1"/>
+          </a:gradFill>
+          <a:ln>
+            <a:noFill/>
+          </a:ln>
+        </p:spPr>
+        <p:style>
+          <a:lnRef idx="2">
+            <a:schemeClr val="accent1">
+              <a:shade val="50000"/>
+            </a:schemeClr>
+          </a:lnRef>
+          <a:fillRef idx="1">
+            <a:schemeClr val="accent1"/>
+          </a:fillRef>
+          <a:effectRef idx="0">
+            <a:schemeClr val="accent1"/>
+          </a:effectRef>
+          <a:fontRef idx="minor">
+            <a:schemeClr val="lt1"/>
+          </a:fontRef>
+        </p:style>
+        <p:txBody>
+          <a:bodyPr rtlCol="0" anchor="ctr"/>
+          <a:lstStyle/>
+          <a:p>
+            <a:pPr algn="ctr"/>
+            <a:r>
+              <a:rPr kumimoji="1" lang="zh-CN" altLang="en-US" dirty="0"/>
+              <a:t>个人信息</a:t>
+            </a:r>
+          </a:p>
+        </p:txBody>
+      </p:sp>
+      <p:sp>
+        <p:nvSpPr>
+          <p:cNvPr id="13" name="左箭头 12">
+            <a:extLst>
+              <a:ext uri="{FF2B5EF4-FFF2-40B4-BE49-F238E27FC236}">
+                <a16:creationId xmlns:a16="http://schemas.microsoft.com/office/drawing/2014/main" id="{F5062AF8-D5FC-B9CD-87B9-7175A5D33A95}"/>
+              </a:ext>
+            </a:extLst>
+          </p:cNvPr>
+          <p:cNvSpPr/>
+          <p:nvPr/>
+        </p:nvSpPr>
+        <p:spPr>
+          <a:xfrm>
+            <a:off x="0" y="2762780"/>
+            <a:ext cx="224444" cy="184666"/>
+          </a:xfrm>
+          <a:prstGeom prst="leftArrow">
+            <a:avLst/>
+          </a:prstGeom>
+          <a:gradFill>
+            <a:gsLst>
+              <a:gs pos="100000">
+                <a:srgbClr val="B993A0">
+                  <a:alpha val="0"/>
+                </a:srgbClr>
+              </a:gs>
+              <a:gs pos="91000">
+                <a:srgbClr val="B993A0">
+                  <a:alpha val="70000"/>
+                </a:srgbClr>
+              </a:gs>
+              <a:gs pos="0">
+                <a:srgbClr val="B993A0"/>
+              </a:gs>
+              <a:gs pos="51000">
+                <a:srgbClr val="B993A0"/>
+              </a:gs>
+            </a:gsLst>
+            <a:lin ang="5400000" scaled="1"/>
+          </a:gradFill>
+          <a:ln>
+            <a:noFill/>
+          </a:ln>
+        </p:spPr>
+        <p:style>
+          <a:lnRef idx="2">
+            <a:schemeClr val="accent1">
+              <a:shade val="50000"/>
+            </a:schemeClr>
+          </a:lnRef>
+          <a:fillRef idx="1">
+            <a:schemeClr val="accent1"/>
+          </a:fillRef>
+          <a:effectRef idx="0">
+            <a:schemeClr val="accent1"/>
+          </a:effectRef>
+          <a:fontRef idx="minor">
+            <a:schemeClr val="lt1"/>
+          </a:fontRef>
+        </p:style>
+        <p:txBody>
+          <a:bodyPr rtlCol="0" anchor="ctr"/>
+          <a:lstStyle/>
+          <a:p>
+            <a:pPr algn="ctr"/>
+            <a:endParaRPr kumimoji="1" lang="zh-CN" altLang="en-US"/>
+          </a:p>
+        </p:txBody>
+      </p:sp>
+      <p:sp>
+        <p:nvSpPr>
+          <p:cNvPr id="14" name="左箭头 13">
+            <a:extLst>
+              <a:ext uri="{FF2B5EF4-FFF2-40B4-BE49-F238E27FC236}">
+                <a16:creationId xmlns:a16="http://schemas.microsoft.com/office/drawing/2014/main" id="{91131D1C-9462-0B39-9A40-9FBD816CB304}"/>
+              </a:ext>
+            </a:extLst>
+          </p:cNvPr>
+          <p:cNvSpPr/>
+          <p:nvPr/>
+        </p:nvSpPr>
+        <p:spPr>
+          <a:xfrm flipH="1">
+            <a:off x="2253356" y="2762780"/>
+            <a:ext cx="236912" cy="224649"/>
+          </a:xfrm>
+          <a:prstGeom prst="leftArrow">
+            <a:avLst/>
+          </a:prstGeom>
+          <a:gradFill>
+            <a:gsLst>
+              <a:gs pos="100000">
+                <a:srgbClr val="B993A0">
+                  <a:alpha val="0"/>
+                </a:srgbClr>
+              </a:gs>
+              <a:gs pos="91000">
+                <a:srgbClr val="B993A0">
+                  <a:alpha val="70000"/>
+                </a:srgbClr>
+              </a:gs>
+              <a:gs pos="0">
+                <a:srgbClr val="B993A0"/>
+              </a:gs>
+              <a:gs pos="51000">
+                <a:srgbClr val="B993A0"/>
+              </a:gs>
+            </a:gsLst>
+            <a:lin ang="5400000" scaled="1"/>
+          </a:gradFill>
+          <a:ln>
+            <a:noFill/>
+          </a:ln>
+        </p:spPr>
+        <p:style>
+          <a:lnRef idx="2">
+            <a:schemeClr val="accent1">
+              <a:shade val="50000"/>
+            </a:schemeClr>
+          </a:lnRef>
+          <a:fillRef idx="1">
+            <a:schemeClr val="accent1"/>
+          </a:fillRef>
+          <a:effectRef idx="0">
+            <a:schemeClr val="accent1"/>
+          </a:effectRef>
+          <a:fontRef idx="minor">
+            <a:schemeClr val="lt1"/>
+          </a:fontRef>
+        </p:style>
+        <p:txBody>
+          <a:bodyPr rtlCol="0" anchor="ctr"/>
+          <a:lstStyle/>
+          <a:p>
+            <a:pPr algn="ctr"/>
+            <a:endParaRPr kumimoji="1" lang="zh-CN" altLang="en-US"/>
+          </a:p>
+        </p:txBody>
+      </p:sp>
+      <p:sp>
+        <p:nvSpPr>
+          <p:cNvPr id="15" name="文本框 14">
+            <a:extLst>
+              <a:ext uri="{FF2B5EF4-FFF2-40B4-BE49-F238E27FC236}">
+                <a16:creationId xmlns:a16="http://schemas.microsoft.com/office/drawing/2014/main" id="{7CCE92E8-6CB9-BA74-5E59-38A1563570FC}"/>
+              </a:ext>
+            </a:extLst>
+          </p:cNvPr>
+          <p:cNvSpPr txBox="1"/>
+          <p:nvPr/>
+        </p:nvSpPr>
+        <p:spPr>
+          <a:xfrm>
+            <a:off x="1286413" y="83530"/>
+            <a:ext cx="1338828" cy="646331"/>
+          </a:xfrm>
+          <a:prstGeom prst="rect">
+            <a:avLst/>
+          </a:prstGeom>
+          <a:noFill/>
+        </p:spPr>
+        <p:txBody>
+          <a:bodyPr wrap="none" rtlCol="0">
+            <a:spAutoFit/>
+          </a:bodyPr>
+          <a:lstStyle/>
+          <a:p>
+            <a:r>
+              <a:rPr kumimoji="1" lang="zh-CN" altLang="en-US" dirty="0"/>
+              <a:t>左滑不喜欢</a:t>
+            </a:r>
+            <a:endParaRPr kumimoji="1" lang="en-US" altLang="zh-CN" dirty="0"/>
+          </a:p>
+          <a:p>
+            <a:r>
+              <a:rPr kumimoji="1" lang="zh-CN" altLang="en-US" dirty="0"/>
+              <a:t>右滑喜欢</a:t>
+            </a:r>
+          </a:p>
+        </p:txBody>
+      </p:sp>
+    </p:spTree>
+    <p:extLst>
+      <p:ext uri="{BB962C8B-B14F-4D97-AF65-F5344CB8AC3E}">
+        <p14:creationId xmlns:p14="http://schemas.microsoft.com/office/powerpoint/2010/main" val="4278715240"/>
+      </p:ext>
+    </p:extLst>
+  </p:cSld>
+  <p:clrMapOvr>
+    <a:masterClrMapping/>
+  </p:clrMapOvr>
+</p:sld>
+</file>
+
+<file path=ppt/slides/slide13.xml><?xml version="1.0" encoding="utf-8"?>
+<p:sld xmlns:a="http://schemas.openxmlformats.org/drawingml/2006/main" xmlns:r="http://schemas.openxmlformats.org/officeDocument/2006/relationships" xmlns:p="http://schemas.openxmlformats.org/presentationml/2006/main">
+  <p:cSld>
+    <p:spTree>
+      <p:nvGrpSpPr>
+        <p:cNvPr id="1" name=""/>
+        <p:cNvGrpSpPr/>
+        <p:nvPr/>
+      </p:nvGrpSpPr>
+      <p:grpSpPr>
+        <a:xfrm>
+          <a:off x="0" y="0"/>
+          <a:ext cx="0" cy="0"/>
+          <a:chOff x="0" y="0"/>
+          <a:chExt cx="0" cy="0"/>
+        </a:xfrm>
+      </p:grpSpPr>
+      <p:sp>
+        <p:nvSpPr>
+          <p:cNvPr id="5" name="矩形 4">
+            <a:extLst>
+              <a:ext uri="{FF2B5EF4-FFF2-40B4-BE49-F238E27FC236}">
+                <a16:creationId xmlns:a16="http://schemas.microsoft.com/office/drawing/2014/main" id="{8ECE4256-12CA-D143-2686-D16E16BCDE32}"/>
+              </a:ext>
+            </a:extLst>
+          </p:cNvPr>
+          <p:cNvSpPr/>
+          <p:nvPr/>
+        </p:nvSpPr>
+        <p:spPr>
+          <a:xfrm>
+            <a:off x="0" y="0"/>
+            <a:ext cx="2519363" cy="1753985"/>
+          </a:xfrm>
+          <a:prstGeom prst="rect">
+            <a:avLst/>
+          </a:prstGeom>
+          <a:gradFill>
+            <a:gsLst>
+              <a:gs pos="100000">
+                <a:srgbClr val="B993A0">
+                  <a:alpha val="0"/>
+                </a:srgbClr>
+              </a:gs>
+              <a:gs pos="91000">
+                <a:srgbClr val="B993A0">
+                  <a:alpha val="70000"/>
+                </a:srgbClr>
+              </a:gs>
+              <a:gs pos="0">
+                <a:srgbClr val="B993A0"/>
+              </a:gs>
+              <a:gs pos="51000">
+                <a:srgbClr val="B993A0"/>
+              </a:gs>
+            </a:gsLst>
+            <a:lin ang="5400000" scaled="1"/>
+          </a:gradFill>
+          <a:ln>
+            <a:noFill/>
+          </a:ln>
+        </p:spPr>
+        <p:style>
+          <a:lnRef idx="2">
+            <a:schemeClr val="accent1">
+              <a:shade val="50000"/>
+            </a:schemeClr>
+          </a:lnRef>
+          <a:fillRef idx="1">
+            <a:schemeClr val="accent1"/>
+          </a:fillRef>
+          <a:effectRef idx="0">
+            <a:schemeClr val="accent1"/>
+          </a:effectRef>
+          <a:fontRef idx="minor">
+            <a:schemeClr val="lt1"/>
+          </a:fontRef>
+        </p:style>
+        <p:txBody>
+          <a:bodyPr rtlCol="0" anchor="ctr"/>
+          <a:lstStyle/>
+          <a:p>
+            <a:pPr algn="ctr"/>
+            <a:endParaRPr kumimoji="1" lang="zh-CN" altLang="en-US" dirty="0"/>
+          </a:p>
+        </p:txBody>
+      </p:sp>
+      <p:sp>
+        <p:nvSpPr>
+          <p:cNvPr id="2" name="文本框 1">
+            <a:extLst>
+              <a:ext uri="{FF2B5EF4-FFF2-40B4-BE49-F238E27FC236}">
+                <a16:creationId xmlns:a16="http://schemas.microsoft.com/office/drawing/2014/main" id="{1560D9B2-1FCD-475F-3644-4345A3C8AD23}"/>
+              </a:ext>
+            </a:extLst>
+          </p:cNvPr>
+          <p:cNvSpPr txBox="1"/>
+          <p:nvPr/>
+        </p:nvSpPr>
+        <p:spPr>
+          <a:xfrm>
+            <a:off x="0" y="478856"/>
+            <a:ext cx="2519363" cy="369332"/>
+          </a:xfrm>
+          <a:prstGeom prst="rect">
+            <a:avLst/>
+          </a:prstGeom>
+          <a:solidFill>
+            <a:srgbClr val="B993A0">
+              <a:alpha val="52834"/>
+            </a:srgbClr>
+          </a:solidFill>
+          <a:ln>
+            <a:solidFill>
+              <a:schemeClr val="bg2">
+                <a:lumMod val="90000"/>
+              </a:schemeClr>
+            </a:solidFill>
+          </a:ln>
+        </p:spPr>
+        <p:txBody>
+          <a:bodyPr wrap="square" rtlCol="0">
+            <a:spAutoFit/>
+          </a:bodyPr>
+          <a:lstStyle/>
+          <a:p>
+            <a:r>
               <a:rPr kumimoji="1" lang="en-US" altLang="zh-CN" dirty="0"/>
               <a:t>//</a:t>
             </a:r>
             <a:r>
               <a:rPr kumimoji="1" lang="zh-CN" altLang="en-US" dirty="0"/>
-              <a:t>查看某个配对信息页面</a:t>
+              <a:t>我的配对页面</a:t>
             </a:r>
           </a:p>
         </p:txBody>
@@ -5457,10 +5414,56 @@
       </p:grpSp>
       <p:sp>
         <p:nvSpPr>
-          <p:cNvPr id="3" name="矩形 2">
+          <p:cNvPr id="16" name="文本框 15">
             <a:extLst>
               <a:ext uri="{FF2B5EF4-FFF2-40B4-BE49-F238E27FC236}">
-                <a16:creationId xmlns:a16="http://schemas.microsoft.com/office/drawing/2014/main" id="{F68B96CA-4611-2452-BA0E-AB900B29713B}"/>
+                <a16:creationId xmlns:a16="http://schemas.microsoft.com/office/drawing/2014/main" id="{635650C1-63AC-3BF5-CAE0-D51346CAA3D1}"/>
+              </a:ext>
+            </a:extLst>
+          </p:cNvPr>
+          <p:cNvSpPr txBox="1"/>
+          <p:nvPr/>
+        </p:nvSpPr>
+        <p:spPr>
+          <a:xfrm>
+            <a:off x="160039" y="2564130"/>
+            <a:ext cx="1039091" cy="646331"/>
+          </a:xfrm>
+          <a:prstGeom prst="rect">
+            <a:avLst/>
+          </a:prstGeom>
+          <a:solidFill>
+            <a:srgbClr val="B993A0">
+              <a:alpha val="52834"/>
+            </a:srgbClr>
+          </a:solidFill>
+          <a:ln>
+            <a:solidFill>
+              <a:schemeClr val="bg2">
+                <a:lumMod val="90000"/>
+              </a:schemeClr>
+            </a:solidFill>
+          </a:ln>
+        </p:spPr>
+        <p:txBody>
+          <a:bodyPr wrap="square" rtlCol="0">
+            <a:spAutoFit/>
+          </a:bodyPr>
+          <a:lstStyle/>
+          <a:p>
+            <a:r>
+              <a:rPr kumimoji="1" lang="zh-CN" altLang="en-US" dirty="0"/>
+              <a:t>名字， 年龄</a:t>
+            </a:r>
+          </a:p>
+        </p:txBody>
+      </p:sp>
+      <p:sp>
+        <p:nvSpPr>
+          <p:cNvPr id="4" name="椭圆 3">
+            <a:extLst>
+              <a:ext uri="{FF2B5EF4-FFF2-40B4-BE49-F238E27FC236}">
+                <a16:creationId xmlns:a16="http://schemas.microsoft.com/office/drawing/2014/main" id="{7BE42D41-B099-8066-2C54-F87F10F4ACA6}"/>
               </a:ext>
             </a:extLst>
           </p:cNvPr>
@@ -5469,8 +5472,265 @@
         </p:nvSpPr>
         <p:spPr>
           <a:xfrm>
-            <a:off x="498764" y="1197033"/>
-            <a:ext cx="1579418" cy="2186247"/>
+            <a:off x="160039" y="1513627"/>
+            <a:ext cx="1039091" cy="1006989"/>
+          </a:xfrm>
+          <a:prstGeom prst="ellipse">
+            <a:avLst/>
+          </a:prstGeom>
+          <a:ln/>
+        </p:spPr>
+        <p:style>
+          <a:lnRef idx="2">
+            <a:schemeClr val="accent1"/>
+          </a:lnRef>
+          <a:fillRef idx="1">
+            <a:schemeClr val="lt1"/>
+          </a:fillRef>
+          <a:effectRef idx="0">
+            <a:schemeClr val="accent1"/>
+          </a:effectRef>
+          <a:fontRef idx="minor">
+            <a:schemeClr val="dk1"/>
+          </a:fontRef>
+        </p:style>
+        <p:txBody>
+          <a:bodyPr rtlCol="0" anchor="ctr"/>
+          <a:lstStyle/>
+          <a:p>
+            <a:pPr algn="ctr"/>
+            <a:endParaRPr kumimoji="1" lang="zh-CN" altLang="en-US"/>
+          </a:p>
+        </p:txBody>
+      </p:sp>
+      <p:sp>
+        <p:nvSpPr>
+          <p:cNvPr id="6" name="文本框 5">
+            <a:extLst>
+              <a:ext uri="{FF2B5EF4-FFF2-40B4-BE49-F238E27FC236}">
+                <a16:creationId xmlns:a16="http://schemas.microsoft.com/office/drawing/2014/main" id="{3CB6ED12-E2A6-D97C-C8EE-A6F9EAFEE666}"/>
+              </a:ext>
+            </a:extLst>
+          </p:cNvPr>
+          <p:cNvSpPr txBox="1"/>
+          <p:nvPr/>
+        </p:nvSpPr>
+        <p:spPr>
+          <a:xfrm>
+            <a:off x="1259681" y="2586797"/>
+            <a:ext cx="1039091" cy="646331"/>
+          </a:xfrm>
+          <a:prstGeom prst="rect">
+            <a:avLst/>
+          </a:prstGeom>
+          <a:solidFill>
+            <a:srgbClr val="B993A0">
+              <a:alpha val="52834"/>
+            </a:srgbClr>
+          </a:solidFill>
+          <a:ln>
+            <a:solidFill>
+              <a:schemeClr val="bg2">
+                <a:lumMod val="90000"/>
+              </a:schemeClr>
+            </a:solidFill>
+          </a:ln>
+        </p:spPr>
+        <p:txBody>
+          <a:bodyPr wrap="square" rtlCol="0">
+            <a:spAutoFit/>
+          </a:bodyPr>
+          <a:lstStyle/>
+          <a:p>
+            <a:r>
+              <a:rPr kumimoji="1" lang="zh-CN" altLang="en-US" dirty="0"/>
+              <a:t>名字， 年龄</a:t>
+            </a:r>
+          </a:p>
+        </p:txBody>
+      </p:sp>
+      <p:sp>
+        <p:nvSpPr>
+          <p:cNvPr id="8" name="椭圆 7">
+            <a:extLst>
+              <a:ext uri="{FF2B5EF4-FFF2-40B4-BE49-F238E27FC236}">
+                <a16:creationId xmlns:a16="http://schemas.microsoft.com/office/drawing/2014/main" id="{C2B4DE7E-C9EB-6DDE-0862-9BDD15FCA829}"/>
+              </a:ext>
+            </a:extLst>
+          </p:cNvPr>
+          <p:cNvSpPr/>
+          <p:nvPr/>
+        </p:nvSpPr>
+        <p:spPr>
+          <a:xfrm>
+            <a:off x="1259681" y="1536294"/>
+            <a:ext cx="1039091" cy="1006989"/>
+          </a:xfrm>
+          <a:prstGeom prst="ellipse">
+            <a:avLst/>
+          </a:prstGeom>
+          <a:ln/>
+        </p:spPr>
+        <p:style>
+          <a:lnRef idx="2">
+            <a:schemeClr val="accent1"/>
+          </a:lnRef>
+          <a:fillRef idx="1">
+            <a:schemeClr val="lt1"/>
+          </a:fillRef>
+          <a:effectRef idx="0">
+            <a:schemeClr val="accent1"/>
+          </a:effectRef>
+          <a:fontRef idx="minor">
+            <a:schemeClr val="dk1"/>
+          </a:fontRef>
+        </p:style>
+        <p:txBody>
+          <a:bodyPr rtlCol="0" anchor="ctr"/>
+          <a:lstStyle/>
+          <a:p>
+            <a:pPr algn="ctr"/>
+            <a:endParaRPr kumimoji="1" lang="zh-CN" altLang="en-US"/>
+          </a:p>
+        </p:txBody>
+      </p:sp>
+      <p:sp>
+        <p:nvSpPr>
+          <p:cNvPr id="17" name="文本框 16">
+            <a:extLst>
+              <a:ext uri="{FF2B5EF4-FFF2-40B4-BE49-F238E27FC236}">
+                <a16:creationId xmlns:a16="http://schemas.microsoft.com/office/drawing/2014/main" id="{BA16E675-81F9-2DA3-12C7-59F4995A3CB3}"/>
+              </a:ext>
+            </a:extLst>
+          </p:cNvPr>
+          <p:cNvSpPr txBox="1"/>
+          <p:nvPr/>
+        </p:nvSpPr>
+        <p:spPr>
+          <a:xfrm>
+            <a:off x="261480" y="4228658"/>
+            <a:ext cx="1039091" cy="646331"/>
+          </a:xfrm>
+          <a:prstGeom prst="rect">
+            <a:avLst/>
+          </a:prstGeom>
+          <a:solidFill>
+            <a:srgbClr val="B993A0">
+              <a:alpha val="52834"/>
+            </a:srgbClr>
+          </a:solidFill>
+          <a:ln>
+            <a:solidFill>
+              <a:schemeClr val="bg2">
+                <a:lumMod val="90000"/>
+              </a:schemeClr>
+            </a:solidFill>
+          </a:ln>
+        </p:spPr>
+        <p:txBody>
+          <a:bodyPr wrap="square" rtlCol="0">
+            <a:spAutoFit/>
+          </a:bodyPr>
+          <a:lstStyle/>
+          <a:p>
+            <a:r>
+              <a:rPr kumimoji="1" lang="zh-CN" altLang="en-US" dirty="0"/>
+              <a:t>名字， 年龄</a:t>
+            </a:r>
+          </a:p>
+        </p:txBody>
+      </p:sp>
+      <p:sp>
+        <p:nvSpPr>
+          <p:cNvPr id="18" name="椭圆 17">
+            <a:extLst>
+              <a:ext uri="{FF2B5EF4-FFF2-40B4-BE49-F238E27FC236}">
+                <a16:creationId xmlns:a16="http://schemas.microsoft.com/office/drawing/2014/main" id="{417B3A73-D39D-2BF7-E609-156B305AEFFB}"/>
+              </a:ext>
+            </a:extLst>
+          </p:cNvPr>
+          <p:cNvSpPr/>
+          <p:nvPr/>
+        </p:nvSpPr>
+        <p:spPr>
+          <a:xfrm>
+            <a:off x="261480" y="3178155"/>
+            <a:ext cx="1039091" cy="1006989"/>
+          </a:xfrm>
+          <a:prstGeom prst="ellipse">
+            <a:avLst/>
+          </a:prstGeom>
+          <a:ln/>
+        </p:spPr>
+        <p:style>
+          <a:lnRef idx="2">
+            <a:schemeClr val="accent1"/>
+          </a:lnRef>
+          <a:fillRef idx="1">
+            <a:schemeClr val="lt1"/>
+          </a:fillRef>
+          <a:effectRef idx="0">
+            <a:schemeClr val="accent1"/>
+          </a:effectRef>
+          <a:fontRef idx="minor">
+            <a:schemeClr val="dk1"/>
+          </a:fontRef>
+        </p:style>
+        <p:txBody>
+          <a:bodyPr rtlCol="0" anchor="ctr"/>
+          <a:lstStyle/>
+          <a:p>
+            <a:pPr algn="ctr"/>
+            <a:endParaRPr kumimoji="1" lang="zh-CN" altLang="en-US"/>
+          </a:p>
+        </p:txBody>
+      </p:sp>
+    </p:spTree>
+    <p:extLst>
+      <p:ext uri="{BB962C8B-B14F-4D97-AF65-F5344CB8AC3E}">
+        <p14:creationId xmlns:p14="http://schemas.microsoft.com/office/powerpoint/2010/main" val="2594591611"/>
+      </p:ext>
+    </p:extLst>
+  </p:cSld>
+  <p:clrMapOvr>
+    <a:masterClrMapping/>
+  </p:clrMapOvr>
+</p:sld>
+</file>
+
+<file path=ppt/slides/slide14.xml><?xml version="1.0" encoding="utf-8"?>
+<p:sld xmlns:a="http://schemas.openxmlformats.org/drawingml/2006/main" xmlns:r="http://schemas.openxmlformats.org/officeDocument/2006/relationships" xmlns:p="http://schemas.openxmlformats.org/presentationml/2006/main">
+  <p:cSld>
+    <p:spTree>
+      <p:nvGrpSpPr>
+        <p:cNvPr id="1" name=""/>
+        <p:cNvGrpSpPr/>
+        <p:nvPr/>
+      </p:nvGrpSpPr>
+      <p:grpSpPr>
+        <a:xfrm>
+          <a:off x="0" y="0"/>
+          <a:ext cx="0" cy="0"/>
+          <a:chOff x="0" y="0"/>
+          <a:chExt cx="0" cy="0"/>
+        </a:xfrm>
+      </p:grpSpPr>
+      <p:sp>
+        <p:nvSpPr>
+          <p:cNvPr id="5" name="矩形 4">
+            <a:extLst>
+              <a:ext uri="{FF2B5EF4-FFF2-40B4-BE49-F238E27FC236}">
+                <a16:creationId xmlns:a16="http://schemas.microsoft.com/office/drawing/2014/main" id="{8ECE4256-12CA-D143-2686-D16E16BCDE32}"/>
+              </a:ext>
+            </a:extLst>
+          </p:cNvPr>
+          <p:cNvSpPr/>
+          <p:nvPr/>
+        </p:nvSpPr>
+        <p:spPr>
+          <a:xfrm>
+            <a:off x="0" y="0"/>
+            <a:ext cx="2519363" cy="1753985"/>
           </a:xfrm>
           <a:prstGeom prst="rect">
             <a:avLst/>
@@ -5527,10 +5787,10 @@
       </p:sp>
       <p:sp>
         <p:nvSpPr>
-          <p:cNvPr id="12" name="文本框 11">
+          <p:cNvPr id="2" name="文本框 1">
             <a:extLst>
               <a:ext uri="{FF2B5EF4-FFF2-40B4-BE49-F238E27FC236}">
-                <a16:creationId xmlns:a16="http://schemas.microsoft.com/office/drawing/2014/main" id="{645737DA-6506-26F8-E59E-27A48DA491C8}"/>
+                <a16:creationId xmlns:a16="http://schemas.microsoft.com/office/drawing/2014/main" id="{1560D9B2-1FCD-475F-3644-4345A3C8AD23}"/>
               </a:ext>
             </a:extLst>
           </p:cNvPr>
@@ -5539,8 +5799,8 @@
         </p:nvSpPr>
         <p:spPr>
           <a:xfrm>
-            <a:off x="740135" y="2762780"/>
-            <a:ext cx="1039091" cy="369332"/>
+            <a:off x="0" y="478856"/>
+            <a:ext cx="2519363" cy="646331"/>
           </a:xfrm>
           <a:prstGeom prst="rect">
             <a:avLst/>
@@ -5565,402 +5825,12 @@
           <a:lstStyle/>
           <a:p>
             <a:r>
-              <a:rPr kumimoji="1" lang="zh-CN" altLang="en-US" dirty="0"/>
-              <a:t>照片</a:t>
-            </a:r>
-          </a:p>
-        </p:txBody>
-      </p:sp>
-      <p:sp>
-        <p:nvSpPr>
-          <p:cNvPr id="13" name="椭圆 12">
-            <a:extLst>
-              <a:ext uri="{FF2B5EF4-FFF2-40B4-BE49-F238E27FC236}">
-                <a16:creationId xmlns:a16="http://schemas.microsoft.com/office/drawing/2014/main" id="{509BD26E-DE4D-F464-9602-C819D809A2AC}"/>
-              </a:ext>
-            </a:extLst>
-          </p:cNvPr>
-          <p:cNvSpPr/>
-          <p:nvPr/>
-        </p:nvSpPr>
-        <p:spPr>
-          <a:xfrm>
-            <a:off x="766868" y="1467778"/>
-            <a:ext cx="1039091" cy="1006989"/>
-          </a:xfrm>
-          <a:prstGeom prst="ellipse">
-            <a:avLst/>
-          </a:prstGeom>
-          <a:ln/>
-        </p:spPr>
-        <p:style>
-          <a:lnRef idx="2">
-            <a:schemeClr val="accent1"/>
-          </a:lnRef>
-          <a:fillRef idx="1">
-            <a:schemeClr val="lt1"/>
-          </a:fillRef>
-          <a:effectRef idx="0">
-            <a:schemeClr val="accent1"/>
-          </a:effectRef>
-          <a:fontRef idx="minor">
-            <a:schemeClr val="dk1"/>
-          </a:fontRef>
-        </p:style>
-        <p:txBody>
-          <a:bodyPr rtlCol="0" anchor="ctr"/>
-          <a:lstStyle/>
-          <a:p>
-            <a:pPr algn="ctr"/>
-            <a:endParaRPr kumimoji="1" lang="zh-CN" altLang="en-US"/>
-          </a:p>
-        </p:txBody>
-      </p:sp>
-      <p:sp>
-        <p:nvSpPr>
-          <p:cNvPr id="14" name="矩形 13">
-            <a:extLst>
-              <a:ext uri="{FF2B5EF4-FFF2-40B4-BE49-F238E27FC236}">
-                <a16:creationId xmlns:a16="http://schemas.microsoft.com/office/drawing/2014/main" id="{C2773A6B-CF4A-E1C2-7693-4948BA5F6833}"/>
-              </a:ext>
-            </a:extLst>
-          </p:cNvPr>
-          <p:cNvSpPr/>
-          <p:nvPr/>
-        </p:nvSpPr>
-        <p:spPr>
-          <a:xfrm>
-            <a:off x="58190" y="3340158"/>
-            <a:ext cx="2461173" cy="1490836"/>
-          </a:xfrm>
-          <a:prstGeom prst="rect">
-            <a:avLst/>
-          </a:prstGeom>
-          <a:gradFill>
-            <a:gsLst>
-              <a:gs pos="100000">
-                <a:srgbClr val="B993A0">
-                  <a:alpha val="0"/>
-                </a:srgbClr>
-              </a:gs>
-              <a:gs pos="91000">
-                <a:srgbClr val="B993A0">
-                  <a:alpha val="70000"/>
-                </a:srgbClr>
-              </a:gs>
-              <a:gs pos="0">
-                <a:srgbClr val="B993A0"/>
-              </a:gs>
-              <a:gs pos="51000">
-                <a:srgbClr val="B993A0"/>
-              </a:gs>
-            </a:gsLst>
-            <a:lin ang="5400000" scaled="1"/>
-          </a:gradFill>
-          <a:ln>
-            <a:noFill/>
-          </a:ln>
-        </p:spPr>
-        <p:style>
-          <a:lnRef idx="2">
-            <a:schemeClr val="accent1">
-              <a:shade val="50000"/>
-            </a:schemeClr>
-          </a:lnRef>
-          <a:fillRef idx="1">
-            <a:schemeClr val="accent1"/>
-          </a:fillRef>
-          <a:effectRef idx="0">
-            <a:schemeClr val="accent1"/>
-          </a:effectRef>
-          <a:fontRef idx="minor">
-            <a:schemeClr val="lt1"/>
-          </a:fontRef>
-        </p:style>
-        <p:txBody>
-          <a:bodyPr rtlCol="0" anchor="ctr"/>
-          <a:lstStyle/>
-          <a:p>
-            <a:pPr algn="ctr"/>
-            <a:r>
-              <a:rPr kumimoji="1" lang="zh-CN" altLang="en-US" dirty="0"/>
-              <a:t>分析（可行吗？）</a:t>
-            </a:r>
-            <a:endParaRPr kumimoji="1" lang="en-US" altLang="zh-CN" dirty="0"/>
-          </a:p>
-          <a:p>
-            <a:pPr algn="ctr"/>
-            <a:r>
-              <a:rPr kumimoji="1" lang="zh-CN" altLang="en-US" dirty="0"/>
-              <a:t>列出匹配项</a:t>
-            </a:r>
-            <a:endParaRPr kumimoji="1" lang="en-US" altLang="zh-CN" dirty="0"/>
-          </a:p>
-          <a:p>
-            <a:pPr algn="ctr"/>
-            <a:r>
-              <a:rPr kumimoji="1" lang="zh-CN" altLang="en-US" dirty="0"/>
-              <a:t>（怎么生成匹配程度？手动输入？？？）</a:t>
-            </a:r>
-          </a:p>
-        </p:txBody>
-      </p:sp>
-      <p:sp>
-        <p:nvSpPr>
-          <p:cNvPr id="20" name="燕尾形箭头 19">
-            <a:hlinkClick r:id="rId4" action="ppaction://hlinksldjump"/>
-            <a:extLst>
-              <a:ext uri="{FF2B5EF4-FFF2-40B4-BE49-F238E27FC236}">
-                <a16:creationId xmlns:a16="http://schemas.microsoft.com/office/drawing/2014/main" id="{8E87E9FC-48B3-8500-2584-00548662009B}"/>
-              </a:ext>
-            </a:extLst>
-          </p:cNvPr>
-          <p:cNvSpPr/>
-          <p:nvPr/>
-        </p:nvSpPr>
-        <p:spPr>
-          <a:xfrm flipH="1">
-            <a:off x="29094" y="70001"/>
-            <a:ext cx="465208" cy="450482"/>
-          </a:xfrm>
-          <a:prstGeom prst="notchedRightArrow">
-            <a:avLst/>
-          </a:prstGeom>
-          <a:solidFill>
-            <a:schemeClr val="accent1"/>
-          </a:solidFill>
-          <a:ln>
-            <a:noFill/>
-          </a:ln>
-        </p:spPr>
-        <p:style>
-          <a:lnRef idx="0">
-            <a:scrgbClr r="0" g="0" b="0"/>
-          </a:lnRef>
-          <a:fillRef idx="0">
-            <a:scrgbClr r="0" g="0" b="0"/>
-          </a:fillRef>
-          <a:effectRef idx="0">
-            <a:scrgbClr r="0" g="0" b="0"/>
-          </a:effectRef>
-          <a:fontRef idx="minor">
-            <a:schemeClr val="lt1"/>
-          </a:fontRef>
-        </p:style>
-        <p:txBody>
-          <a:bodyPr rtlCol="0" anchor="ctr"/>
-          <a:lstStyle/>
-          <a:p>
-            <a:pPr algn="ctr"/>
-            <a:endParaRPr kumimoji="1" lang="zh-CN" altLang="en-US">
-              <a:ln w="0"/>
-              <a:solidFill>
-                <a:schemeClr val="accent1"/>
-              </a:solidFill>
-              <a:effectLst>
-                <a:outerShdw blurRad="38100" dist="25400" dir="5400000" algn="ctr" rotWithShape="0">
-                  <a:srgbClr val="6E747A">
-                    <a:alpha val="43000"/>
-                  </a:srgbClr>
-                </a:outerShdw>
-              </a:effectLst>
-            </a:endParaRPr>
-          </a:p>
-        </p:txBody>
-      </p:sp>
-    </p:spTree>
-    <p:extLst>
-      <p:ext uri="{BB962C8B-B14F-4D97-AF65-F5344CB8AC3E}">
-        <p14:creationId xmlns:p14="http://schemas.microsoft.com/office/powerpoint/2010/main" val="9419939"/>
-      </p:ext>
-    </p:extLst>
-  </p:cSld>
-  <p:clrMapOvr>
-    <a:masterClrMapping/>
-  </p:clrMapOvr>
-</p:sld>
-</file>
-
-<file path=ppt/slides/slide14.xml><?xml version="1.0" encoding="utf-8"?>
-<p:sld xmlns:a="http://schemas.openxmlformats.org/drawingml/2006/main" xmlns:r="http://schemas.openxmlformats.org/officeDocument/2006/relationships" xmlns:p="http://schemas.openxmlformats.org/presentationml/2006/main">
-  <p:cSld>
-    <p:spTree>
-      <p:nvGrpSpPr>
-        <p:cNvPr id="1" name=""/>
-        <p:cNvGrpSpPr/>
-        <p:nvPr/>
-      </p:nvGrpSpPr>
-      <p:grpSpPr>
-        <a:xfrm>
-          <a:off x="0" y="0"/>
-          <a:ext cx="0" cy="0"/>
-          <a:chOff x="0" y="0"/>
-          <a:chExt cx="0" cy="0"/>
-        </a:xfrm>
-      </p:grpSpPr>
-      <p:sp>
-        <p:nvSpPr>
-          <p:cNvPr id="5" name="矩形 4">
-            <a:extLst>
-              <a:ext uri="{FF2B5EF4-FFF2-40B4-BE49-F238E27FC236}">
-                <a16:creationId xmlns:a16="http://schemas.microsoft.com/office/drawing/2014/main" id="{8ECE4256-12CA-D143-2686-D16E16BCDE32}"/>
-              </a:ext>
-            </a:extLst>
-          </p:cNvPr>
-          <p:cNvSpPr/>
-          <p:nvPr/>
-        </p:nvSpPr>
-        <p:spPr>
-          <a:xfrm>
-            <a:off x="0" y="0"/>
-            <a:ext cx="2519363" cy="1753985"/>
-          </a:xfrm>
-          <a:prstGeom prst="rect">
-            <a:avLst/>
-          </a:prstGeom>
-          <a:gradFill>
-            <a:gsLst>
-              <a:gs pos="100000">
-                <a:srgbClr val="B993A0">
-                  <a:alpha val="0"/>
-                </a:srgbClr>
-              </a:gs>
-              <a:gs pos="91000">
-                <a:srgbClr val="B993A0">
-                  <a:alpha val="70000"/>
-                </a:srgbClr>
-              </a:gs>
-              <a:gs pos="0">
-                <a:srgbClr val="B993A0"/>
-              </a:gs>
-              <a:gs pos="51000">
-                <a:srgbClr val="B993A0"/>
-              </a:gs>
-            </a:gsLst>
-            <a:lin ang="5400000" scaled="1"/>
-          </a:gradFill>
-          <a:ln>
-            <a:noFill/>
-          </a:ln>
-        </p:spPr>
-        <p:style>
-          <a:lnRef idx="2">
-            <a:schemeClr val="accent1">
-              <a:shade val="50000"/>
-            </a:schemeClr>
-          </a:lnRef>
-          <a:fillRef idx="1">
-            <a:schemeClr val="accent1"/>
-          </a:fillRef>
-          <a:effectRef idx="0">
-            <a:schemeClr val="accent1"/>
-          </a:effectRef>
-          <a:fontRef idx="minor">
-            <a:schemeClr val="lt1"/>
-          </a:fontRef>
-        </p:style>
-        <p:txBody>
-          <a:bodyPr rtlCol="0" anchor="ctr"/>
-          <a:lstStyle/>
-          <a:p>
-            <a:pPr algn="ctr"/>
-            <a:endParaRPr kumimoji="1" lang="zh-CN" altLang="en-US" dirty="0"/>
-          </a:p>
-        </p:txBody>
-      </p:sp>
-      <p:sp>
-        <p:nvSpPr>
-          <p:cNvPr id="8" name="文本框 7">
-            <a:extLst>
-              <a:ext uri="{FF2B5EF4-FFF2-40B4-BE49-F238E27FC236}">
-                <a16:creationId xmlns:a16="http://schemas.microsoft.com/office/drawing/2014/main" id="{8C3C745E-54C4-118E-0E96-024A32762E39}"/>
-              </a:ext>
-            </a:extLst>
-          </p:cNvPr>
-          <p:cNvSpPr txBox="1"/>
-          <p:nvPr/>
-        </p:nvSpPr>
-        <p:spPr>
-          <a:xfrm>
-            <a:off x="29094" y="1886986"/>
-            <a:ext cx="2519363" cy="369332"/>
-          </a:xfrm>
-          <a:prstGeom prst="rect">
-            <a:avLst/>
-          </a:prstGeom>
-          <a:solidFill>
-            <a:srgbClr val="B993A0">
-              <a:alpha val="52834"/>
-            </a:srgbClr>
-          </a:solidFill>
-          <a:ln>
-            <a:solidFill>
-              <a:schemeClr val="bg2">
-                <a:lumMod val="90000"/>
-              </a:schemeClr>
-            </a:solidFill>
-          </a:ln>
-        </p:spPr>
-        <p:txBody>
-          <a:bodyPr wrap="square" rtlCol="0">
-            <a:spAutoFit/>
-          </a:bodyPr>
-          <a:lstStyle/>
-          <a:p>
-            <a:r>
-              <a:rPr kumimoji="1" lang="zh-CN" altLang="en-US" dirty="0"/>
-              <a:t>姓名</a:t>
-            </a:r>
-            <a:endParaRPr kumimoji="1" lang="en-US" altLang="zh-CN" dirty="0"/>
-          </a:p>
-        </p:txBody>
-      </p:sp>
-      <p:sp>
-        <p:nvSpPr>
-          <p:cNvPr id="2" name="文本框 1">
-            <a:extLst>
-              <a:ext uri="{FF2B5EF4-FFF2-40B4-BE49-F238E27FC236}">
-                <a16:creationId xmlns:a16="http://schemas.microsoft.com/office/drawing/2014/main" id="{1560D9B2-1FCD-475F-3644-4345A3C8AD23}"/>
-              </a:ext>
-            </a:extLst>
-          </p:cNvPr>
-          <p:cNvSpPr txBox="1"/>
-          <p:nvPr/>
-        </p:nvSpPr>
-        <p:spPr>
-          <a:xfrm>
-            <a:off x="0" y="478856"/>
-            <a:ext cx="2519363" cy="369332"/>
-          </a:xfrm>
-          <a:prstGeom prst="rect">
-            <a:avLst/>
-          </a:prstGeom>
-          <a:solidFill>
-            <a:srgbClr val="B993A0">
-              <a:alpha val="52834"/>
-            </a:srgbClr>
-          </a:solidFill>
-          <a:ln>
-            <a:solidFill>
-              <a:schemeClr val="bg2">
-                <a:lumMod val="90000"/>
-              </a:schemeClr>
-            </a:solidFill>
-          </a:ln>
-        </p:spPr>
-        <p:txBody>
-          <a:bodyPr wrap="square" rtlCol="0">
-            <a:spAutoFit/>
-          </a:bodyPr>
-          <a:lstStyle/>
-          <a:p>
-            <a:r>
               <a:rPr kumimoji="1" lang="en-US" altLang="zh-CN" dirty="0"/>
               <a:t>//</a:t>
             </a:r>
             <a:r>
               <a:rPr kumimoji="1" lang="zh-CN" altLang="en-US" dirty="0"/>
-              <a:t>个人信息填写页面</a:t>
+              <a:t>查看某个配对信息页面</a:t>
             </a:r>
           </a:p>
         </p:txBody>
@@ -6160,10 +6030,80 @@
       </p:grpSp>
       <p:sp>
         <p:nvSpPr>
-          <p:cNvPr id="3" name="文本框 2">
+          <p:cNvPr id="3" name="矩形 2">
             <a:extLst>
               <a:ext uri="{FF2B5EF4-FFF2-40B4-BE49-F238E27FC236}">
-                <a16:creationId xmlns:a16="http://schemas.microsoft.com/office/drawing/2014/main" id="{DE1751BB-A37C-12E1-0225-1BA76190E30C}"/>
+                <a16:creationId xmlns:a16="http://schemas.microsoft.com/office/drawing/2014/main" id="{F68B96CA-4611-2452-BA0E-AB900B29713B}"/>
+              </a:ext>
+            </a:extLst>
+          </p:cNvPr>
+          <p:cNvSpPr/>
+          <p:nvPr/>
+        </p:nvSpPr>
+        <p:spPr>
+          <a:xfrm>
+            <a:off x="498764" y="1197033"/>
+            <a:ext cx="1579418" cy="2186247"/>
+          </a:xfrm>
+          <a:prstGeom prst="rect">
+            <a:avLst/>
+          </a:prstGeom>
+          <a:gradFill>
+            <a:gsLst>
+              <a:gs pos="100000">
+                <a:srgbClr val="B993A0">
+                  <a:alpha val="0"/>
+                </a:srgbClr>
+              </a:gs>
+              <a:gs pos="91000">
+                <a:srgbClr val="B993A0">
+                  <a:alpha val="70000"/>
+                </a:srgbClr>
+              </a:gs>
+              <a:gs pos="0">
+                <a:srgbClr val="B993A0"/>
+              </a:gs>
+              <a:gs pos="51000">
+                <a:srgbClr val="B993A0"/>
+              </a:gs>
+            </a:gsLst>
+            <a:lin ang="5400000" scaled="1"/>
+          </a:gradFill>
+          <a:ln>
+            <a:noFill/>
+          </a:ln>
+        </p:spPr>
+        <p:style>
+          <a:lnRef idx="2">
+            <a:schemeClr val="accent1">
+              <a:shade val="50000"/>
+            </a:schemeClr>
+          </a:lnRef>
+          <a:fillRef idx="1">
+            <a:schemeClr val="accent1"/>
+          </a:fillRef>
+          <a:effectRef idx="0">
+            <a:schemeClr val="accent1"/>
+          </a:effectRef>
+          <a:fontRef idx="minor">
+            <a:schemeClr val="lt1"/>
+          </a:fontRef>
+        </p:style>
+        <p:txBody>
+          <a:bodyPr rtlCol="0" anchor="ctr"/>
+          <a:lstStyle/>
+          <a:p>
+            <a:pPr algn="ctr"/>
+            <a:endParaRPr kumimoji="1" lang="zh-CN" altLang="en-US" dirty="0"/>
+          </a:p>
+        </p:txBody>
+      </p:sp>
+      <p:sp>
+        <p:nvSpPr>
+          <p:cNvPr id="12" name="文本框 11">
+            <a:extLst>
+              <a:ext uri="{FF2B5EF4-FFF2-40B4-BE49-F238E27FC236}">
+                <a16:creationId xmlns:a16="http://schemas.microsoft.com/office/drawing/2014/main" id="{645737DA-6506-26F8-E59E-27A48DA491C8}"/>
               </a:ext>
             </a:extLst>
           </p:cNvPr>
@@ -6172,8 +6112,8 @@
         </p:nvSpPr>
         <p:spPr>
           <a:xfrm>
-            <a:off x="29094" y="2341193"/>
-            <a:ext cx="2519363" cy="369332"/>
+            <a:off x="740135" y="2762780"/>
+            <a:ext cx="1039091" cy="369332"/>
           </a:xfrm>
           <a:prstGeom prst="rect">
             <a:avLst/>
@@ -6199,6 +6139,639 @@
           <a:p>
             <a:r>
               <a:rPr kumimoji="1" lang="zh-CN" altLang="en-US" dirty="0"/>
+              <a:t>照片</a:t>
+            </a:r>
+          </a:p>
+        </p:txBody>
+      </p:sp>
+      <p:sp>
+        <p:nvSpPr>
+          <p:cNvPr id="13" name="椭圆 12">
+            <a:extLst>
+              <a:ext uri="{FF2B5EF4-FFF2-40B4-BE49-F238E27FC236}">
+                <a16:creationId xmlns:a16="http://schemas.microsoft.com/office/drawing/2014/main" id="{509BD26E-DE4D-F464-9602-C819D809A2AC}"/>
+              </a:ext>
+            </a:extLst>
+          </p:cNvPr>
+          <p:cNvSpPr/>
+          <p:nvPr/>
+        </p:nvSpPr>
+        <p:spPr>
+          <a:xfrm>
+            <a:off x="766868" y="1467778"/>
+            <a:ext cx="1039091" cy="1006989"/>
+          </a:xfrm>
+          <a:prstGeom prst="ellipse">
+            <a:avLst/>
+          </a:prstGeom>
+          <a:ln/>
+        </p:spPr>
+        <p:style>
+          <a:lnRef idx="2">
+            <a:schemeClr val="accent1"/>
+          </a:lnRef>
+          <a:fillRef idx="1">
+            <a:schemeClr val="lt1"/>
+          </a:fillRef>
+          <a:effectRef idx="0">
+            <a:schemeClr val="accent1"/>
+          </a:effectRef>
+          <a:fontRef idx="minor">
+            <a:schemeClr val="dk1"/>
+          </a:fontRef>
+        </p:style>
+        <p:txBody>
+          <a:bodyPr rtlCol="0" anchor="ctr"/>
+          <a:lstStyle/>
+          <a:p>
+            <a:pPr algn="ctr"/>
+            <a:endParaRPr kumimoji="1" lang="zh-CN" altLang="en-US"/>
+          </a:p>
+        </p:txBody>
+      </p:sp>
+      <p:sp>
+        <p:nvSpPr>
+          <p:cNvPr id="14" name="矩形 13">
+            <a:extLst>
+              <a:ext uri="{FF2B5EF4-FFF2-40B4-BE49-F238E27FC236}">
+                <a16:creationId xmlns:a16="http://schemas.microsoft.com/office/drawing/2014/main" id="{C2773A6B-CF4A-E1C2-7693-4948BA5F6833}"/>
+              </a:ext>
+            </a:extLst>
+          </p:cNvPr>
+          <p:cNvSpPr/>
+          <p:nvPr/>
+        </p:nvSpPr>
+        <p:spPr>
+          <a:xfrm>
+            <a:off x="58190" y="3340158"/>
+            <a:ext cx="2461173" cy="1490836"/>
+          </a:xfrm>
+          <a:prstGeom prst="rect">
+            <a:avLst/>
+          </a:prstGeom>
+          <a:gradFill>
+            <a:gsLst>
+              <a:gs pos="100000">
+                <a:srgbClr val="B993A0">
+                  <a:alpha val="0"/>
+                </a:srgbClr>
+              </a:gs>
+              <a:gs pos="91000">
+                <a:srgbClr val="B993A0">
+                  <a:alpha val="70000"/>
+                </a:srgbClr>
+              </a:gs>
+              <a:gs pos="0">
+                <a:srgbClr val="B993A0"/>
+              </a:gs>
+              <a:gs pos="51000">
+                <a:srgbClr val="B993A0"/>
+              </a:gs>
+            </a:gsLst>
+            <a:lin ang="5400000" scaled="1"/>
+          </a:gradFill>
+          <a:ln>
+            <a:noFill/>
+          </a:ln>
+        </p:spPr>
+        <p:style>
+          <a:lnRef idx="2">
+            <a:schemeClr val="accent1">
+              <a:shade val="50000"/>
+            </a:schemeClr>
+          </a:lnRef>
+          <a:fillRef idx="1">
+            <a:schemeClr val="accent1"/>
+          </a:fillRef>
+          <a:effectRef idx="0">
+            <a:schemeClr val="accent1"/>
+          </a:effectRef>
+          <a:fontRef idx="minor">
+            <a:schemeClr val="lt1"/>
+          </a:fontRef>
+        </p:style>
+        <p:txBody>
+          <a:bodyPr rtlCol="0" anchor="ctr"/>
+          <a:lstStyle/>
+          <a:p>
+            <a:pPr algn="ctr"/>
+            <a:r>
+              <a:rPr kumimoji="1" lang="zh-CN" altLang="en-US" dirty="0"/>
+              <a:t>分析（可行吗？）</a:t>
+            </a:r>
+            <a:endParaRPr kumimoji="1" lang="en-US" altLang="zh-CN" dirty="0"/>
+          </a:p>
+          <a:p>
+            <a:pPr algn="ctr"/>
+            <a:r>
+              <a:rPr kumimoji="1" lang="zh-CN" altLang="en-US" dirty="0"/>
+              <a:t>列出匹配项</a:t>
+            </a:r>
+            <a:endParaRPr kumimoji="1" lang="en-US" altLang="zh-CN" dirty="0"/>
+          </a:p>
+          <a:p>
+            <a:pPr algn="ctr"/>
+            <a:r>
+              <a:rPr kumimoji="1" lang="zh-CN" altLang="en-US" dirty="0"/>
+              <a:t>（怎么生成匹配程度？手动输入？？？）</a:t>
+            </a:r>
+          </a:p>
+        </p:txBody>
+      </p:sp>
+      <p:sp>
+        <p:nvSpPr>
+          <p:cNvPr id="20" name="燕尾形箭头 19">
+            <a:hlinkClick r:id="rId4" action="ppaction://hlinksldjump"/>
+            <a:extLst>
+              <a:ext uri="{FF2B5EF4-FFF2-40B4-BE49-F238E27FC236}">
+                <a16:creationId xmlns:a16="http://schemas.microsoft.com/office/drawing/2014/main" id="{8E87E9FC-48B3-8500-2584-00548662009B}"/>
+              </a:ext>
+            </a:extLst>
+          </p:cNvPr>
+          <p:cNvSpPr/>
+          <p:nvPr/>
+        </p:nvSpPr>
+        <p:spPr>
+          <a:xfrm flipH="1">
+            <a:off x="29094" y="70001"/>
+            <a:ext cx="465208" cy="450482"/>
+          </a:xfrm>
+          <a:prstGeom prst="notchedRightArrow">
+            <a:avLst/>
+          </a:prstGeom>
+          <a:solidFill>
+            <a:schemeClr val="accent1"/>
+          </a:solidFill>
+          <a:ln>
+            <a:noFill/>
+          </a:ln>
+        </p:spPr>
+        <p:style>
+          <a:lnRef idx="0">
+            <a:scrgbClr r="0" g="0" b="0"/>
+          </a:lnRef>
+          <a:fillRef idx="0">
+            <a:scrgbClr r="0" g="0" b="0"/>
+          </a:fillRef>
+          <a:effectRef idx="0">
+            <a:scrgbClr r="0" g="0" b="0"/>
+          </a:effectRef>
+          <a:fontRef idx="minor">
+            <a:schemeClr val="lt1"/>
+          </a:fontRef>
+        </p:style>
+        <p:txBody>
+          <a:bodyPr rtlCol="0" anchor="ctr"/>
+          <a:lstStyle/>
+          <a:p>
+            <a:pPr algn="ctr"/>
+            <a:endParaRPr kumimoji="1" lang="zh-CN" altLang="en-US">
+              <a:ln w="0"/>
+              <a:solidFill>
+                <a:schemeClr val="accent1"/>
+              </a:solidFill>
+              <a:effectLst>
+                <a:outerShdw blurRad="38100" dist="25400" dir="5400000" algn="ctr" rotWithShape="0">
+                  <a:srgbClr val="6E747A">
+                    <a:alpha val="43000"/>
+                  </a:srgbClr>
+                </a:outerShdw>
+              </a:effectLst>
+            </a:endParaRPr>
+          </a:p>
+        </p:txBody>
+      </p:sp>
+    </p:spTree>
+    <p:extLst>
+      <p:ext uri="{BB962C8B-B14F-4D97-AF65-F5344CB8AC3E}">
+        <p14:creationId xmlns:p14="http://schemas.microsoft.com/office/powerpoint/2010/main" val="9419939"/>
+      </p:ext>
+    </p:extLst>
+  </p:cSld>
+  <p:clrMapOvr>
+    <a:masterClrMapping/>
+  </p:clrMapOvr>
+</p:sld>
+</file>
+
+<file path=ppt/slides/slide15.xml><?xml version="1.0" encoding="utf-8"?>
+<p:sld xmlns:a="http://schemas.openxmlformats.org/drawingml/2006/main" xmlns:r="http://schemas.openxmlformats.org/officeDocument/2006/relationships" xmlns:p="http://schemas.openxmlformats.org/presentationml/2006/main">
+  <p:cSld>
+    <p:spTree>
+      <p:nvGrpSpPr>
+        <p:cNvPr id="1" name=""/>
+        <p:cNvGrpSpPr/>
+        <p:nvPr/>
+      </p:nvGrpSpPr>
+      <p:grpSpPr>
+        <a:xfrm>
+          <a:off x="0" y="0"/>
+          <a:ext cx="0" cy="0"/>
+          <a:chOff x="0" y="0"/>
+          <a:chExt cx="0" cy="0"/>
+        </a:xfrm>
+      </p:grpSpPr>
+      <p:sp>
+        <p:nvSpPr>
+          <p:cNvPr id="5" name="矩形 4">
+            <a:extLst>
+              <a:ext uri="{FF2B5EF4-FFF2-40B4-BE49-F238E27FC236}">
+                <a16:creationId xmlns:a16="http://schemas.microsoft.com/office/drawing/2014/main" id="{8ECE4256-12CA-D143-2686-D16E16BCDE32}"/>
+              </a:ext>
+            </a:extLst>
+          </p:cNvPr>
+          <p:cNvSpPr/>
+          <p:nvPr/>
+        </p:nvSpPr>
+        <p:spPr>
+          <a:xfrm>
+            <a:off x="0" y="0"/>
+            <a:ext cx="2519363" cy="1753985"/>
+          </a:xfrm>
+          <a:prstGeom prst="rect">
+            <a:avLst/>
+          </a:prstGeom>
+          <a:gradFill>
+            <a:gsLst>
+              <a:gs pos="100000">
+                <a:srgbClr val="B993A0">
+                  <a:alpha val="0"/>
+                </a:srgbClr>
+              </a:gs>
+              <a:gs pos="91000">
+                <a:srgbClr val="B993A0">
+                  <a:alpha val="70000"/>
+                </a:srgbClr>
+              </a:gs>
+              <a:gs pos="0">
+                <a:srgbClr val="B993A0"/>
+              </a:gs>
+              <a:gs pos="51000">
+                <a:srgbClr val="B993A0"/>
+              </a:gs>
+            </a:gsLst>
+            <a:lin ang="5400000" scaled="1"/>
+          </a:gradFill>
+          <a:ln>
+            <a:noFill/>
+          </a:ln>
+        </p:spPr>
+        <p:style>
+          <a:lnRef idx="2">
+            <a:schemeClr val="accent1">
+              <a:shade val="50000"/>
+            </a:schemeClr>
+          </a:lnRef>
+          <a:fillRef idx="1">
+            <a:schemeClr val="accent1"/>
+          </a:fillRef>
+          <a:effectRef idx="0">
+            <a:schemeClr val="accent1"/>
+          </a:effectRef>
+          <a:fontRef idx="minor">
+            <a:schemeClr val="lt1"/>
+          </a:fontRef>
+        </p:style>
+        <p:txBody>
+          <a:bodyPr rtlCol="0" anchor="ctr"/>
+          <a:lstStyle/>
+          <a:p>
+            <a:pPr algn="ctr"/>
+            <a:endParaRPr kumimoji="1" lang="zh-CN" altLang="en-US" dirty="0"/>
+          </a:p>
+        </p:txBody>
+      </p:sp>
+      <p:sp>
+        <p:nvSpPr>
+          <p:cNvPr id="8" name="文本框 7">
+            <a:extLst>
+              <a:ext uri="{FF2B5EF4-FFF2-40B4-BE49-F238E27FC236}">
+                <a16:creationId xmlns:a16="http://schemas.microsoft.com/office/drawing/2014/main" id="{8C3C745E-54C4-118E-0E96-024A32762E39}"/>
+              </a:ext>
+            </a:extLst>
+          </p:cNvPr>
+          <p:cNvSpPr txBox="1"/>
+          <p:nvPr/>
+        </p:nvSpPr>
+        <p:spPr>
+          <a:xfrm>
+            <a:off x="29094" y="1886986"/>
+            <a:ext cx="2519363" cy="369332"/>
+          </a:xfrm>
+          <a:prstGeom prst="rect">
+            <a:avLst/>
+          </a:prstGeom>
+          <a:solidFill>
+            <a:srgbClr val="B993A0">
+              <a:alpha val="52834"/>
+            </a:srgbClr>
+          </a:solidFill>
+          <a:ln>
+            <a:solidFill>
+              <a:schemeClr val="bg2">
+                <a:lumMod val="90000"/>
+              </a:schemeClr>
+            </a:solidFill>
+          </a:ln>
+        </p:spPr>
+        <p:txBody>
+          <a:bodyPr wrap="square" rtlCol="0">
+            <a:spAutoFit/>
+          </a:bodyPr>
+          <a:lstStyle/>
+          <a:p>
+            <a:r>
+              <a:rPr kumimoji="1" lang="zh-CN" altLang="en-US" dirty="0"/>
+              <a:t>姓名</a:t>
+            </a:r>
+            <a:endParaRPr kumimoji="1" lang="en-US" altLang="zh-CN" dirty="0"/>
+          </a:p>
+        </p:txBody>
+      </p:sp>
+      <p:sp>
+        <p:nvSpPr>
+          <p:cNvPr id="2" name="文本框 1">
+            <a:extLst>
+              <a:ext uri="{FF2B5EF4-FFF2-40B4-BE49-F238E27FC236}">
+                <a16:creationId xmlns:a16="http://schemas.microsoft.com/office/drawing/2014/main" id="{1560D9B2-1FCD-475F-3644-4345A3C8AD23}"/>
+              </a:ext>
+            </a:extLst>
+          </p:cNvPr>
+          <p:cNvSpPr txBox="1"/>
+          <p:nvPr/>
+        </p:nvSpPr>
+        <p:spPr>
+          <a:xfrm>
+            <a:off x="0" y="478856"/>
+            <a:ext cx="2519363" cy="369332"/>
+          </a:xfrm>
+          <a:prstGeom prst="rect">
+            <a:avLst/>
+          </a:prstGeom>
+          <a:solidFill>
+            <a:srgbClr val="B993A0">
+              <a:alpha val="52834"/>
+            </a:srgbClr>
+          </a:solidFill>
+          <a:ln>
+            <a:solidFill>
+              <a:schemeClr val="bg2">
+                <a:lumMod val="90000"/>
+              </a:schemeClr>
+            </a:solidFill>
+          </a:ln>
+        </p:spPr>
+        <p:txBody>
+          <a:bodyPr wrap="square" rtlCol="0">
+            <a:spAutoFit/>
+          </a:bodyPr>
+          <a:lstStyle/>
+          <a:p>
+            <a:r>
+              <a:rPr kumimoji="1" lang="en-US" altLang="zh-CN" dirty="0"/>
+              <a:t>//</a:t>
+            </a:r>
+            <a:r>
+              <a:rPr kumimoji="1" lang="zh-CN" altLang="en-US" dirty="0"/>
+              <a:t>个人信息填写页面</a:t>
+            </a:r>
+          </a:p>
+        </p:txBody>
+      </p:sp>
+      <p:grpSp>
+        <p:nvGrpSpPr>
+          <p:cNvPr id="7" name="组合 6">
+            <a:extLst>
+              <a:ext uri="{FF2B5EF4-FFF2-40B4-BE49-F238E27FC236}">
+                <a16:creationId xmlns:a16="http://schemas.microsoft.com/office/drawing/2014/main" id="{4857090D-BB98-D336-9AF7-BEEAC2DD952F}"/>
+              </a:ext>
+            </a:extLst>
+          </p:cNvPr>
+          <p:cNvGrpSpPr/>
+          <p:nvPr/>
+        </p:nvGrpSpPr>
+        <p:grpSpPr>
+          <a:xfrm>
+            <a:off x="1" y="4879571"/>
+            <a:ext cx="2490267" cy="521104"/>
+            <a:chOff x="1" y="4879571"/>
+            <a:chExt cx="2490267" cy="521104"/>
+          </a:xfrm>
+        </p:grpSpPr>
+        <p:sp>
+          <p:nvSpPr>
+            <p:cNvPr id="9" name="同侧圆角矩形 8">
+              <a:extLst>
+                <a:ext uri="{FF2B5EF4-FFF2-40B4-BE49-F238E27FC236}">
+                  <a16:creationId xmlns:a16="http://schemas.microsoft.com/office/drawing/2014/main" id="{E9DC5ADC-B53C-0707-D6D1-3B101415D23A}"/>
+                </a:ext>
+              </a:extLst>
+            </p:cNvPr>
+            <p:cNvSpPr/>
+            <p:nvPr/>
+          </p:nvSpPr>
+          <p:spPr>
+            <a:xfrm>
+              <a:off x="29094" y="4879571"/>
+              <a:ext cx="2461174" cy="521104"/>
+            </a:xfrm>
+            <a:prstGeom prst="round2SameRect">
+              <a:avLst/>
+            </a:prstGeom>
+            <a:solidFill>
+              <a:schemeClr val="bg1"/>
+            </a:solidFill>
+            <a:ln>
+              <a:noFill/>
+            </a:ln>
+          </p:spPr>
+          <p:style>
+            <a:lnRef idx="2">
+              <a:schemeClr val="accent1">
+                <a:shade val="50000"/>
+              </a:schemeClr>
+            </a:lnRef>
+            <a:fillRef idx="1">
+              <a:schemeClr val="accent1"/>
+            </a:fillRef>
+            <a:effectRef idx="0">
+              <a:schemeClr val="accent1"/>
+            </a:effectRef>
+            <a:fontRef idx="minor">
+              <a:schemeClr val="lt1"/>
+            </a:fontRef>
+          </p:style>
+          <p:txBody>
+            <a:bodyPr rtlCol="0" anchor="ctr"/>
+            <a:lstStyle/>
+            <a:p>
+              <a:pPr algn="ctr"/>
+              <a:endParaRPr kumimoji="1" lang="zh-CN" altLang="en-US"/>
+            </a:p>
+          </p:txBody>
+        </p:sp>
+        <p:sp>
+          <p:nvSpPr>
+            <p:cNvPr id="10" name="圆角矩形 9">
+              <a:hlinkClick r:id="rId2" action="ppaction://hlinksldjump"/>
+              <a:extLst>
+                <a:ext uri="{FF2B5EF4-FFF2-40B4-BE49-F238E27FC236}">
+                  <a16:creationId xmlns:a16="http://schemas.microsoft.com/office/drawing/2014/main" id="{CC6C9604-ED8B-F5FF-589C-E6098C3F495C}"/>
+                </a:ext>
+              </a:extLst>
+            </p:cNvPr>
+            <p:cNvSpPr/>
+            <p:nvPr/>
+          </p:nvSpPr>
+          <p:spPr>
+            <a:xfrm>
+              <a:off x="1" y="4976726"/>
+              <a:ext cx="615142" cy="423949"/>
+            </a:xfrm>
+            <a:prstGeom prst="roundRect">
+              <a:avLst/>
+            </a:prstGeom>
+            <a:solidFill>
+              <a:schemeClr val="bg1"/>
+            </a:solidFill>
+            <a:ln>
+              <a:noFill/>
+            </a:ln>
+          </p:spPr>
+          <p:style>
+            <a:lnRef idx="2">
+              <a:schemeClr val="accent1">
+                <a:shade val="50000"/>
+              </a:schemeClr>
+            </a:lnRef>
+            <a:fillRef idx="1">
+              <a:schemeClr val="accent1"/>
+            </a:fillRef>
+            <a:effectRef idx="0">
+              <a:schemeClr val="accent1"/>
+            </a:effectRef>
+            <a:fontRef idx="minor">
+              <a:schemeClr val="lt1"/>
+            </a:fontRef>
+          </p:style>
+          <p:txBody>
+            <a:bodyPr rtlCol="0" anchor="ctr"/>
+            <a:lstStyle/>
+            <a:p>
+              <a:pPr algn="ctr"/>
+              <a:r>
+                <a:rPr kumimoji="1" lang="zh-CN" altLang="en-US" sz="1200" dirty="0">
+                  <a:solidFill>
+                    <a:schemeClr val="tx1"/>
+                  </a:solidFill>
+                </a:rPr>
+                <a:t>首页</a:t>
+              </a:r>
+            </a:p>
+          </p:txBody>
+        </p:sp>
+        <p:sp>
+          <p:nvSpPr>
+            <p:cNvPr id="11" name="圆角矩形 10">
+              <a:hlinkClick r:id="rId3" action="ppaction://hlinksldjump"/>
+              <a:extLst>
+                <a:ext uri="{FF2B5EF4-FFF2-40B4-BE49-F238E27FC236}">
+                  <a16:creationId xmlns:a16="http://schemas.microsoft.com/office/drawing/2014/main" id="{630AAFEF-2EBF-A04B-AF57-E5AEE84FE425}"/>
+                </a:ext>
+              </a:extLst>
+            </p:cNvPr>
+            <p:cNvSpPr/>
+            <p:nvPr/>
+          </p:nvSpPr>
+          <p:spPr>
+            <a:xfrm>
+              <a:off x="1954703" y="4976726"/>
+              <a:ext cx="535565" cy="423949"/>
+            </a:xfrm>
+            <a:prstGeom prst="roundRect">
+              <a:avLst/>
+            </a:prstGeom>
+            <a:solidFill>
+              <a:schemeClr val="bg1"/>
+            </a:solidFill>
+            <a:ln>
+              <a:noFill/>
+            </a:ln>
+          </p:spPr>
+          <p:style>
+            <a:lnRef idx="2">
+              <a:schemeClr val="accent1">
+                <a:shade val="50000"/>
+              </a:schemeClr>
+            </a:lnRef>
+            <a:fillRef idx="1">
+              <a:schemeClr val="accent1"/>
+            </a:fillRef>
+            <a:effectRef idx="0">
+              <a:schemeClr val="accent1"/>
+            </a:effectRef>
+            <a:fontRef idx="minor">
+              <a:schemeClr val="lt1"/>
+            </a:fontRef>
+          </p:style>
+          <p:txBody>
+            <a:bodyPr rtlCol="0" anchor="ctr"/>
+            <a:lstStyle/>
+            <a:p>
+              <a:pPr algn="ctr"/>
+              <a:r>
+                <a:rPr kumimoji="1" lang="zh-CN" altLang="en-US" sz="1200" dirty="0">
+                  <a:solidFill>
+                    <a:schemeClr val="tx1"/>
+                  </a:solidFill>
+                </a:rPr>
+                <a:t>我的</a:t>
+              </a:r>
+            </a:p>
+          </p:txBody>
+        </p:sp>
+      </p:grpSp>
+      <p:sp>
+        <p:nvSpPr>
+          <p:cNvPr id="3" name="文本框 2">
+            <a:extLst>
+              <a:ext uri="{FF2B5EF4-FFF2-40B4-BE49-F238E27FC236}">
+                <a16:creationId xmlns:a16="http://schemas.microsoft.com/office/drawing/2014/main" id="{DE1751BB-A37C-12E1-0225-1BA76190E30C}"/>
+              </a:ext>
+            </a:extLst>
+          </p:cNvPr>
+          <p:cNvSpPr txBox="1"/>
+          <p:nvPr/>
+        </p:nvSpPr>
+        <p:spPr>
+          <a:xfrm>
+            <a:off x="29094" y="2341193"/>
+            <a:ext cx="2519363" cy="369332"/>
+          </a:xfrm>
+          <a:prstGeom prst="rect">
+            <a:avLst/>
+          </a:prstGeom>
+          <a:solidFill>
+            <a:srgbClr val="B993A0">
+              <a:alpha val="52834"/>
+            </a:srgbClr>
+          </a:solidFill>
+          <a:ln>
+            <a:solidFill>
+              <a:schemeClr val="bg2">
+                <a:lumMod val="90000"/>
+              </a:schemeClr>
+            </a:solidFill>
+          </a:ln>
+        </p:spPr>
+        <p:txBody>
+          <a:bodyPr wrap="square" rtlCol="0">
+            <a:spAutoFit/>
+          </a:bodyPr>
+          <a:lstStyle/>
+          <a:p>
+            <a:r>
+              <a:rPr kumimoji="1" lang="zh-CN" altLang="en-US" dirty="0"/>
               <a:t>性别</a:t>
             </a:r>
             <a:endParaRPr kumimoji="1" lang="en-US" altLang="zh-CN" dirty="0"/>
@@ -6219,6 +6792,301 @@
 </file>
 
 <file path=ppt/slides/slide2.xml><?xml version="1.0" encoding="utf-8"?>
+<p:sld xmlns:a="http://schemas.openxmlformats.org/drawingml/2006/main" xmlns:r="http://schemas.openxmlformats.org/officeDocument/2006/relationships" xmlns:p="http://schemas.openxmlformats.org/presentationml/2006/main">
+  <p:cSld>
+    <p:spTree>
+      <p:nvGrpSpPr>
+        <p:cNvPr id="1" name=""/>
+        <p:cNvGrpSpPr/>
+        <p:nvPr/>
+      </p:nvGrpSpPr>
+      <p:grpSpPr>
+        <a:xfrm>
+          <a:off x="0" y="0"/>
+          <a:ext cx="0" cy="0"/>
+          <a:chOff x="0" y="0"/>
+          <a:chExt cx="0" cy="0"/>
+        </a:xfrm>
+      </p:grpSpPr>
+      <p:sp>
+        <p:nvSpPr>
+          <p:cNvPr id="4" name="文本框 3">
+            <a:extLst>
+              <a:ext uri="{FF2B5EF4-FFF2-40B4-BE49-F238E27FC236}">
+                <a16:creationId xmlns:a16="http://schemas.microsoft.com/office/drawing/2014/main" id="{F7E91857-C3C5-3CC0-EC8F-91120C3529AE}"/>
+              </a:ext>
+            </a:extLst>
+          </p:cNvPr>
+          <p:cNvSpPr txBox="1"/>
+          <p:nvPr/>
+        </p:nvSpPr>
+        <p:spPr>
+          <a:xfrm>
+            <a:off x="-1263535" y="3175462"/>
+            <a:ext cx="877163" cy="369332"/>
+          </a:xfrm>
+          <a:prstGeom prst="rect">
+            <a:avLst/>
+          </a:prstGeom>
+          <a:noFill/>
+        </p:spPr>
+        <p:txBody>
+          <a:bodyPr wrap="none" rtlCol="0">
+            <a:spAutoFit/>
+          </a:bodyPr>
+          <a:lstStyle/>
+          <a:p>
+            <a:r>
+              <a:rPr kumimoji="1" lang="zh-CN" altLang="en-US" dirty="0">
+                <a:solidFill>
+                  <a:schemeClr val="bg1"/>
+                </a:solidFill>
+              </a:rPr>
+              <a:t>登录页</a:t>
+            </a:r>
+            <a:endParaRPr kumimoji="1" lang="en-US" altLang="zh-CN" dirty="0">
+              <a:solidFill>
+                <a:schemeClr val="bg1"/>
+              </a:solidFill>
+            </a:endParaRPr>
+          </a:p>
+        </p:txBody>
+      </p:sp>
+      <p:sp>
+        <p:nvSpPr>
+          <p:cNvPr id="5" name="圆角矩形 4">
+            <a:extLst>
+              <a:ext uri="{FF2B5EF4-FFF2-40B4-BE49-F238E27FC236}">
+                <a16:creationId xmlns:a16="http://schemas.microsoft.com/office/drawing/2014/main" id="{E57371F9-737F-B0A0-71D2-E2F7CC9E1670}"/>
+              </a:ext>
+            </a:extLst>
+          </p:cNvPr>
+          <p:cNvSpPr/>
+          <p:nvPr/>
+        </p:nvSpPr>
+        <p:spPr>
+          <a:xfrm>
+            <a:off x="216434" y="1214145"/>
+            <a:ext cx="2086494" cy="2370913"/>
+          </a:xfrm>
+          <a:prstGeom prst="roundRect">
+            <a:avLst/>
+          </a:prstGeom>
+          <a:solidFill>
+            <a:schemeClr val="tx2">
+              <a:lumMod val="20000"/>
+              <a:lumOff val="80000"/>
+            </a:schemeClr>
+          </a:solidFill>
+          <a:ln>
+            <a:noFill/>
+          </a:ln>
+        </p:spPr>
+        <p:style>
+          <a:lnRef idx="2">
+            <a:schemeClr val="accent1">
+              <a:shade val="50000"/>
+            </a:schemeClr>
+          </a:lnRef>
+          <a:fillRef idx="1">
+            <a:schemeClr val="accent1"/>
+          </a:fillRef>
+          <a:effectRef idx="0">
+            <a:schemeClr val="accent1"/>
+          </a:effectRef>
+          <a:fontRef idx="minor">
+            <a:schemeClr val="lt1"/>
+          </a:fontRef>
+        </p:style>
+        <p:txBody>
+          <a:bodyPr rtlCol="0" anchor="ctr"/>
+          <a:lstStyle/>
+          <a:p>
+            <a:pPr algn="ctr"/>
+            <a:endParaRPr kumimoji="1" lang="zh-CN" altLang="en-US"/>
+          </a:p>
+        </p:txBody>
+      </p:sp>
+      <p:sp>
+        <p:nvSpPr>
+          <p:cNvPr id="6" name="文本框 5">
+            <a:extLst>
+              <a:ext uri="{FF2B5EF4-FFF2-40B4-BE49-F238E27FC236}">
+                <a16:creationId xmlns:a16="http://schemas.microsoft.com/office/drawing/2014/main" id="{C61FFC9A-08BF-ED10-D06B-8B85CB93E1D8}"/>
+              </a:ext>
+            </a:extLst>
+          </p:cNvPr>
+          <p:cNvSpPr txBox="1"/>
+          <p:nvPr/>
+        </p:nvSpPr>
+        <p:spPr>
+          <a:xfrm>
+            <a:off x="684415" y="1465811"/>
+            <a:ext cx="1338828" cy="369332"/>
+          </a:xfrm>
+          <a:prstGeom prst="rect">
+            <a:avLst/>
+          </a:prstGeom>
+          <a:noFill/>
+        </p:spPr>
+        <p:txBody>
+          <a:bodyPr wrap="none" rtlCol="0">
+            <a:spAutoFit/>
+          </a:bodyPr>
+          <a:lstStyle/>
+          <a:p>
+            <a:r>
+              <a:rPr kumimoji="1" lang="zh-CN" altLang="en-US" dirty="0"/>
+              <a:t>授权登录？</a:t>
+            </a:r>
+            <a:endParaRPr kumimoji="1" lang="en-US" altLang="zh-CN" dirty="0"/>
+          </a:p>
+        </p:txBody>
+      </p:sp>
+      <p:sp>
+        <p:nvSpPr>
+          <p:cNvPr id="7" name="文本框 6">
+            <a:extLst>
+              <a:ext uri="{FF2B5EF4-FFF2-40B4-BE49-F238E27FC236}">
+                <a16:creationId xmlns:a16="http://schemas.microsoft.com/office/drawing/2014/main" id="{E0760BD3-80B0-69F5-BACC-C161C1522987}"/>
+              </a:ext>
+            </a:extLst>
+          </p:cNvPr>
+          <p:cNvSpPr txBox="1"/>
+          <p:nvPr/>
+        </p:nvSpPr>
+        <p:spPr>
+          <a:xfrm>
+            <a:off x="476548" y="3147753"/>
+            <a:ext cx="646331" cy="369332"/>
+          </a:xfrm>
+          <a:prstGeom prst="rect">
+            <a:avLst/>
+          </a:prstGeom>
+          <a:noFill/>
+        </p:spPr>
+        <p:txBody>
+          <a:bodyPr wrap="none" rtlCol="0">
+            <a:spAutoFit/>
+          </a:bodyPr>
+          <a:lstStyle/>
+          <a:p>
+            <a:r>
+              <a:rPr kumimoji="1" lang="zh-CN" altLang="en-US" dirty="0"/>
+              <a:t>同意</a:t>
+            </a:r>
+            <a:endParaRPr kumimoji="1" lang="en-US" altLang="zh-CN" dirty="0"/>
+          </a:p>
+        </p:txBody>
+      </p:sp>
+      <p:sp>
+        <p:nvSpPr>
+          <p:cNvPr id="8" name="文本框 7">
+            <a:extLst>
+              <a:ext uri="{FF2B5EF4-FFF2-40B4-BE49-F238E27FC236}">
+                <a16:creationId xmlns:a16="http://schemas.microsoft.com/office/drawing/2014/main" id="{FACC8ADB-138C-BB08-CA09-E0AE6AC1F558}"/>
+              </a:ext>
+            </a:extLst>
+          </p:cNvPr>
+          <p:cNvSpPr txBox="1"/>
+          <p:nvPr/>
+        </p:nvSpPr>
+        <p:spPr>
+          <a:xfrm>
+            <a:off x="1259681" y="3175462"/>
+            <a:ext cx="877163" cy="369332"/>
+          </a:xfrm>
+          <a:prstGeom prst="rect">
+            <a:avLst/>
+          </a:prstGeom>
+          <a:noFill/>
+        </p:spPr>
+        <p:txBody>
+          <a:bodyPr wrap="none" rtlCol="0">
+            <a:spAutoFit/>
+          </a:bodyPr>
+          <a:lstStyle/>
+          <a:p>
+            <a:r>
+              <a:rPr kumimoji="1" lang="zh-CN" altLang="en-US" dirty="0"/>
+              <a:t>不同意</a:t>
+            </a:r>
+            <a:endParaRPr kumimoji="1" lang="en-US" altLang="zh-CN" dirty="0"/>
+          </a:p>
+        </p:txBody>
+      </p:sp>
+      <p:sp>
+        <p:nvSpPr>
+          <p:cNvPr id="9" name="椭圆 8">
+            <a:extLst>
+              <a:ext uri="{FF2B5EF4-FFF2-40B4-BE49-F238E27FC236}">
+                <a16:creationId xmlns:a16="http://schemas.microsoft.com/office/drawing/2014/main" id="{F422CE90-7A56-D975-528A-7E498CEB6C2D}"/>
+              </a:ext>
+            </a:extLst>
+          </p:cNvPr>
+          <p:cNvSpPr/>
+          <p:nvPr/>
+        </p:nvSpPr>
+        <p:spPr>
+          <a:xfrm>
+            <a:off x="910669" y="4256116"/>
+            <a:ext cx="698269" cy="698269"/>
+          </a:xfrm>
+          <a:prstGeom prst="ellipse">
+            <a:avLst/>
+          </a:prstGeom>
+          <a:solidFill>
+            <a:schemeClr val="accent6">
+              <a:lumMod val="75000"/>
+            </a:schemeClr>
+          </a:solidFill>
+          <a:ln>
+            <a:noFill/>
+          </a:ln>
+        </p:spPr>
+        <p:style>
+          <a:lnRef idx="2">
+            <a:schemeClr val="accent1">
+              <a:shade val="50000"/>
+            </a:schemeClr>
+          </a:lnRef>
+          <a:fillRef idx="1">
+            <a:schemeClr val="accent1"/>
+          </a:fillRef>
+          <a:effectRef idx="0">
+            <a:schemeClr val="accent1"/>
+          </a:effectRef>
+          <a:fontRef idx="minor">
+            <a:schemeClr val="lt1"/>
+          </a:fontRef>
+        </p:style>
+        <p:txBody>
+          <a:bodyPr rtlCol="0" anchor="ctr"/>
+          <a:lstStyle/>
+          <a:p>
+            <a:pPr algn="ctr"/>
+            <a:r>
+              <a:rPr kumimoji="1" lang="en-US" altLang="zh-CN" dirty="0"/>
+              <a:t>LOGO</a:t>
+            </a:r>
+            <a:endParaRPr kumimoji="1" lang="zh-CN" altLang="en-US" dirty="0"/>
+          </a:p>
+        </p:txBody>
+      </p:sp>
+    </p:spTree>
+    <p:extLst>
+      <p:ext uri="{BB962C8B-B14F-4D97-AF65-F5344CB8AC3E}">
+        <p14:creationId xmlns:p14="http://schemas.microsoft.com/office/powerpoint/2010/main" val="565958428"/>
+      </p:ext>
+    </p:extLst>
+  </p:cSld>
+  <p:clrMapOvr>
+    <a:masterClrMapping/>
+  </p:clrMapOvr>
+</p:sld>
+</file>
+
+<file path=ppt/slides/slide3.xml><?xml version="1.0" encoding="utf-8"?>
 <p:sld xmlns:a="http://schemas.openxmlformats.org/drawingml/2006/main" xmlns:r="http://schemas.openxmlformats.org/officeDocument/2006/relationships" xmlns:p="http://schemas.openxmlformats.org/presentationml/2006/main">
   <p:cSld>
     <p:spTree>
@@ -6921,7 +7789,7 @@
 </p:sld>
 </file>
 
-<file path=ppt/slides/slide3.xml><?xml version="1.0" encoding="utf-8"?>
+<file path=ppt/slides/slide4.xml><?xml version="1.0" encoding="utf-8"?>
 <p:sld xmlns:a="http://schemas.openxmlformats.org/drawingml/2006/main" xmlns:r="http://schemas.openxmlformats.org/officeDocument/2006/relationships" xmlns:p="http://schemas.openxmlformats.org/presentationml/2006/main">
   <p:cSld>
     <p:spTree>
@@ -7562,7 +8430,7 @@
 </p:sld>
 </file>
 
-<file path=ppt/slides/slide4.xml><?xml version="1.0" encoding="utf-8"?>
+<file path=ppt/slides/slide5.xml><?xml version="1.0" encoding="utf-8"?>
 <p:sld xmlns:a="http://schemas.openxmlformats.org/drawingml/2006/main" xmlns:r="http://schemas.openxmlformats.org/officeDocument/2006/relationships" xmlns:p="http://schemas.openxmlformats.org/presentationml/2006/main">
   <p:cSld>
     <p:spTree>
@@ -7948,7 +8816,7 @@
 </p:sld>
 </file>
 
-<file path=ppt/slides/slide5.xml><?xml version="1.0" encoding="utf-8"?>
+<file path=ppt/slides/slide6.xml><?xml version="1.0" encoding="utf-8"?>
 <p:sld xmlns:a="http://schemas.openxmlformats.org/drawingml/2006/main" xmlns:r="http://schemas.openxmlformats.org/officeDocument/2006/relationships" xmlns:p="http://schemas.openxmlformats.org/presentationml/2006/main">
   <p:cSld>
     <p:spTree>
@@ -8562,7 +9430,7 @@
 </p:sld>
 </file>
 
-<file path=ppt/slides/slide6.xml><?xml version="1.0" encoding="utf-8"?>
+<file path=ppt/slides/slide7.xml><?xml version="1.0" encoding="utf-8"?>
 <p:sld xmlns:a="http://schemas.openxmlformats.org/drawingml/2006/main" xmlns:r="http://schemas.openxmlformats.org/officeDocument/2006/relationships" xmlns:p="http://schemas.openxmlformats.org/presentationml/2006/main">
   <p:cSld>
     <p:spTree>
@@ -9019,7 +9887,7 @@
 </p:sld>
 </file>
 
-<file path=ppt/slides/slide7.xml><?xml version="1.0" encoding="utf-8"?>
+<file path=ppt/slides/slide8.xml><?xml version="1.0" encoding="utf-8"?>
 <p:sld xmlns:a="http://schemas.openxmlformats.org/drawingml/2006/main" xmlns:r="http://schemas.openxmlformats.org/officeDocument/2006/relationships" xmlns:p="http://schemas.openxmlformats.org/presentationml/2006/main">
   <p:cSld>
     <p:spTree>
@@ -9629,7 +10497,7 @@
 </p:sld>
 </file>
 
-<file path=ppt/slides/slide8.xml><?xml version="1.0" encoding="utf-8"?>
+<file path=ppt/slides/slide9.xml><?xml version="1.0" encoding="utf-8"?>
 <p:sld xmlns:a="http://schemas.openxmlformats.org/drawingml/2006/main" xmlns:r="http://schemas.openxmlformats.org/officeDocument/2006/relationships" xmlns:p="http://schemas.openxmlformats.org/presentationml/2006/main">
   <p:cSld>
     <p:spTree>
@@ -10126,762 +10994,6 @@
     <p:extLst>
       <p:ext uri="{BB962C8B-B14F-4D97-AF65-F5344CB8AC3E}">
         <p14:creationId xmlns:p14="http://schemas.microsoft.com/office/powerpoint/2010/main" val="1654103547"/>
-      </p:ext>
-    </p:extLst>
-  </p:cSld>
-  <p:clrMapOvr>
-    <a:masterClrMapping/>
-  </p:clrMapOvr>
-</p:sld>
-</file>
-
-<file path=ppt/slides/slide9.xml><?xml version="1.0" encoding="utf-8"?>
-<p:sld xmlns:a="http://schemas.openxmlformats.org/drawingml/2006/main" xmlns:r="http://schemas.openxmlformats.org/officeDocument/2006/relationships" xmlns:p="http://schemas.openxmlformats.org/presentationml/2006/main">
-  <p:cSld>
-    <p:spTree>
-      <p:nvGrpSpPr>
-        <p:cNvPr id="1" name=""/>
-        <p:cNvGrpSpPr/>
-        <p:nvPr/>
-      </p:nvGrpSpPr>
-      <p:grpSpPr>
-        <a:xfrm>
-          <a:off x="0" y="0"/>
-          <a:ext cx="0" cy="0"/>
-          <a:chOff x="0" y="0"/>
-          <a:chExt cx="0" cy="0"/>
-        </a:xfrm>
-      </p:grpSpPr>
-      <p:sp>
-        <p:nvSpPr>
-          <p:cNvPr id="5" name="矩形 4">
-            <a:extLst>
-              <a:ext uri="{FF2B5EF4-FFF2-40B4-BE49-F238E27FC236}">
-                <a16:creationId xmlns:a16="http://schemas.microsoft.com/office/drawing/2014/main" id="{8ECE4256-12CA-D143-2686-D16E16BCDE32}"/>
-              </a:ext>
-            </a:extLst>
-          </p:cNvPr>
-          <p:cNvSpPr/>
-          <p:nvPr/>
-        </p:nvSpPr>
-        <p:spPr>
-          <a:xfrm>
-            <a:off x="0" y="0"/>
-            <a:ext cx="2519363" cy="1753985"/>
-          </a:xfrm>
-          <a:prstGeom prst="rect">
-            <a:avLst/>
-          </a:prstGeom>
-          <a:gradFill>
-            <a:gsLst>
-              <a:gs pos="100000">
-                <a:srgbClr val="B993A0">
-                  <a:alpha val="0"/>
-                </a:srgbClr>
-              </a:gs>
-              <a:gs pos="91000">
-                <a:srgbClr val="B993A0">
-                  <a:alpha val="70000"/>
-                </a:srgbClr>
-              </a:gs>
-              <a:gs pos="0">
-                <a:srgbClr val="B993A0"/>
-              </a:gs>
-              <a:gs pos="51000">
-                <a:srgbClr val="B993A0"/>
-              </a:gs>
-            </a:gsLst>
-            <a:lin ang="5400000" scaled="1"/>
-          </a:gradFill>
-          <a:ln>
-            <a:noFill/>
-          </a:ln>
-        </p:spPr>
-        <p:style>
-          <a:lnRef idx="2">
-            <a:schemeClr val="accent1">
-              <a:shade val="50000"/>
-            </a:schemeClr>
-          </a:lnRef>
-          <a:fillRef idx="1">
-            <a:schemeClr val="accent1"/>
-          </a:fillRef>
-          <a:effectRef idx="0">
-            <a:schemeClr val="accent1"/>
-          </a:effectRef>
-          <a:fontRef idx="minor">
-            <a:schemeClr val="lt1"/>
-          </a:fontRef>
-        </p:style>
-        <p:txBody>
-          <a:bodyPr rtlCol="0" anchor="ctr"/>
-          <a:lstStyle/>
-          <a:p>
-            <a:pPr algn="ctr"/>
-            <a:endParaRPr kumimoji="1" lang="zh-CN" altLang="en-US" dirty="0"/>
-          </a:p>
-        </p:txBody>
-      </p:sp>
-      <p:sp>
-        <p:nvSpPr>
-          <p:cNvPr id="8" name="文本框 7">
-            <a:extLst>
-              <a:ext uri="{FF2B5EF4-FFF2-40B4-BE49-F238E27FC236}">
-                <a16:creationId xmlns:a16="http://schemas.microsoft.com/office/drawing/2014/main" id="{8C3C745E-54C4-118E-0E96-024A32762E39}"/>
-              </a:ext>
-            </a:extLst>
-          </p:cNvPr>
-          <p:cNvSpPr txBox="1"/>
-          <p:nvPr/>
-        </p:nvSpPr>
-        <p:spPr>
-          <a:xfrm>
-            <a:off x="29094" y="1886986"/>
-            <a:ext cx="2519363" cy="646331"/>
-          </a:xfrm>
-          <a:prstGeom prst="rect">
-            <a:avLst/>
-          </a:prstGeom>
-          <a:solidFill>
-            <a:srgbClr val="B993A0">
-              <a:alpha val="52834"/>
-            </a:srgbClr>
-          </a:solidFill>
-          <a:ln>
-            <a:solidFill>
-              <a:schemeClr val="bg2">
-                <a:lumMod val="90000"/>
-              </a:schemeClr>
-            </a:solidFill>
-          </a:ln>
-        </p:spPr>
-        <p:txBody>
-          <a:bodyPr wrap="square" rtlCol="0">
-            <a:spAutoFit/>
-          </a:bodyPr>
-          <a:lstStyle/>
-          <a:p>
-            <a:r>
-              <a:rPr kumimoji="1" lang="zh-CN" altLang="en-US" dirty="0"/>
-              <a:t>测试题</a:t>
-            </a:r>
-            <a:endParaRPr kumimoji="1" lang="en-US" altLang="zh-CN" dirty="0"/>
-          </a:p>
-          <a:p>
-            <a:r>
-              <a:rPr kumimoji="1" lang="en-US" altLang="zh-CN" dirty="0" err="1"/>
-              <a:t>xxxxxxxxxxxxxxxx</a:t>
-            </a:r>
-            <a:endParaRPr kumimoji="1" lang="zh-CN" altLang="en-US" dirty="0"/>
-          </a:p>
-        </p:txBody>
-      </p:sp>
-      <p:sp>
-        <p:nvSpPr>
-          <p:cNvPr id="2" name="文本框 1">
-            <a:extLst>
-              <a:ext uri="{FF2B5EF4-FFF2-40B4-BE49-F238E27FC236}">
-                <a16:creationId xmlns:a16="http://schemas.microsoft.com/office/drawing/2014/main" id="{1560D9B2-1FCD-475F-3644-4345A3C8AD23}"/>
-              </a:ext>
-            </a:extLst>
-          </p:cNvPr>
-          <p:cNvSpPr txBox="1"/>
-          <p:nvPr/>
-        </p:nvSpPr>
-        <p:spPr>
-          <a:xfrm>
-            <a:off x="0" y="478856"/>
-            <a:ext cx="2519363" cy="369332"/>
-          </a:xfrm>
-          <a:prstGeom prst="rect">
-            <a:avLst/>
-          </a:prstGeom>
-          <a:solidFill>
-            <a:srgbClr val="B993A0">
-              <a:alpha val="52834"/>
-            </a:srgbClr>
-          </a:solidFill>
-          <a:ln>
-            <a:solidFill>
-              <a:schemeClr val="bg2">
-                <a:lumMod val="90000"/>
-              </a:schemeClr>
-            </a:solidFill>
-          </a:ln>
-        </p:spPr>
-        <p:txBody>
-          <a:bodyPr wrap="square" rtlCol="0">
-            <a:spAutoFit/>
-          </a:bodyPr>
-          <a:lstStyle/>
-          <a:p>
-            <a:r>
-              <a:rPr kumimoji="1" lang="en-US" altLang="zh-CN" dirty="0"/>
-              <a:t>//</a:t>
-            </a:r>
-            <a:r>
-              <a:rPr kumimoji="1" lang="zh-CN" altLang="en-US" dirty="0"/>
-              <a:t>测试页面</a:t>
-            </a:r>
-          </a:p>
-        </p:txBody>
-      </p:sp>
-      <p:sp>
-        <p:nvSpPr>
-          <p:cNvPr id="3" name="文本框 2">
-            <a:extLst>
-              <a:ext uri="{FF2B5EF4-FFF2-40B4-BE49-F238E27FC236}">
-                <a16:creationId xmlns:a16="http://schemas.microsoft.com/office/drawing/2014/main" id="{A7A67E33-7FA0-ABA7-606C-6483B887B4F8}"/>
-              </a:ext>
-            </a:extLst>
-          </p:cNvPr>
-          <p:cNvSpPr txBox="1"/>
-          <p:nvPr/>
-        </p:nvSpPr>
-        <p:spPr>
-          <a:xfrm>
-            <a:off x="0" y="2665173"/>
-            <a:ext cx="2519363" cy="369332"/>
-          </a:xfrm>
-          <a:prstGeom prst="rect">
-            <a:avLst/>
-          </a:prstGeom>
-          <a:solidFill>
-            <a:srgbClr val="B993A0">
-              <a:alpha val="52834"/>
-            </a:srgbClr>
-          </a:solidFill>
-          <a:ln>
-            <a:solidFill>
-              <a:schemeClr val="bg2">
-                <a:lumMod val="90000"/>
-              </a:schemeClr>
-            </a:solidFill>
-          </a:ln>
-        </p:spPr>
-        <p:txBody>
-          <a:bodyPr wrap="square" rtlCol="0">
-            <a:spAutoFit/>
-          </a:bodyPr>
-          <a:lstStyle/>
-          <a:p>
-            <a:r>
-              <a:rPr kumimoji="1" lang="zh-CN" altLang="en-US" dirty="0"/>
-              <a:t>选项</a:t>
-            </a:r>
-            <a:r>
-              <a:rPr kumimoji="1" lang="en-US" altLang="zh-CN" dirty="0"/>
-              <a:t>a</a:t>
-            </a:r>
-            <a:endParaRPr kumimoji="1" lang="zh-CN" altLang="en-US" dirty="0"/>
-          </a:p>
-        </p:txBody>
-      </p:sp>
-      <p:grpSp>
-        <p:nvGrpSpPr>
-          <p:cNvPr id="7" name="组合 6">
-            <a:extLst>
-              <a:ext uri="{FF2B5EF4-FFF2-40B4-BE49-F238E27FC236}">
-                <a16:creationId xmlns:a16="http://schemas.microsoft.com/office/drawing/2014/main" id="{4857090D-BB98-D336-9AF7-BEEAC2DD952F}"/>
-              </a:ext>
-            </a:extLst>
-          </p:cNvPr>
-          <p:cNvGrpSpPr/>
-          <p:nvPr/>
-        </p:nvGrpSpPr>
-        <p:grpSpPr>
-          <a:xfrm>
-            <a:off x="1" y="4879571"/>
-            <a:ext cx="2490267" cy="521104"/>
-            <a:chOff x="1" y="4879571"/>
-            <a:chExt cx="2490267" cy="521104"/>
-          </a:xfrm>
-        </p:grpSpPr>
-        <p:sp>
-          <p:nvSpPr>
-            <p:cNvPr id="9" name="同侧圆角矩形 8">
-              <a:extLst>
-                <a:ext uri="{FF2B5EF4-FFF2-40B4-BE49-F238E27FC236}">
-                  <a16:creationId xmlns:a16="http://schemas.microsoft.com/office/drawing/2014/main" id="{E9DC5ADC-B53C-0707-D6D1-3B101415D23A}"/>
-                </a:ext>
-              </a:extLst>
-            </p:cNvPr>
-            <p:cNvSpPr/>
-            <p:nvPr/>
-          </p:nvSpPr>
-          <p:spPr>
-            <a:xfrm>
-              <a:off x="29094" y="4879571"/>
-              <a:ext cx="2461174" cy="521104"/>
-            </a:xfrm>
-            <a:prstGeom prst="round2SameRect">
-              <a:avLst/>
-            </a:prstGeom>
-            <a:solidFill>
-              <a:schemeClr val="bg1"/>
-            </a:solidFill>
-            <a:ln>
-              <a:noFill/>
-            </a:ln>
-          </p:spPr>
-          <p:style>
-            <a:lnRef idx="2">
-              <a:schemeClr val="accent1">
-                <a:shade val="50000"/>
-              </a:schemeClr>
-            </a:lnRef>
-            <a:fillRef idx="1">
-              <a:schemeClr val="accent1"/>
-            </a:fillRef>
-            <a:effectRef idx="0">
-              <a:schemeClr val="accent1"/>
-            </a:effectRef>
-            <a:fontRef idx="minor">
-              <a:schemeClr val="lt1"/>
-            </a:fontRef>
-          </p:style>
-          <p:txBody>
-            <a:bodyPr rtlCol="0" anchor="ctr"/>
-            <a:lstStyle/>
-            <a:p>
-              <a:pPr algn="ctr"/>
-              <a:endParaRPr kumimoji="1" lang="zh-CN" altLang="en-US"/>
-            </a:p>
-          </p:txBody>
-        </p:sp>
-        <p:sp>
-          <p:nvSpPr>
-            <p:cNvPr id="10" name="圆角矩形 9">
-              <a:hlinkClick r:id="rId2" action="ppaction://hlinksldjump"/>
-              <a:extLst>
-                <a:ext uri="{FF2B5EF4-FFF2-40B4-BE49-F238E27FC236}">
-                  <a16:creationId xmlns:a16="http://schemas.microsoft.com/office/drawing/2014/main" id="{CC6C9604-ED8B-F5FF-589C-E6098C3F495C}"/>
-                </a:ext>
-              </a:extLst>
-            </p:cNvPr>
-            <p:cNvSpPr/>
-            <p:nvPr/>
-          </p:nvSpPr>
-          <p:spPr>
-            <a:xfrm>
-              <a:off x="1" y="4976726"/>
-              <a:ext cx="615142" cy="423949"/>
-            </a:xfrm>
-            <a:prstGeom prst="roundRect">
-              <a:avLst/>
-            </a:prstGeom>
-            <a:solidFill>
-              <a:schemeClr val="bg1"/>
-            </a:solidFill>
-            <a:ln>
-              <a:noFill/>
-            </a:ln>
-          </p:spPr>
-          <p:style>
-            <a:lnRef idx="2">
-              <a:schemeClr val="accent1">
-                <a:shade val="50000"/>
-              </a:schemeClr>
-            </a:lnRef>
-            <a:fillRef idx="1">
-              <a:schemeClr val="accent1"/>
-            </a:fillRef>
-            <a:effectRef idx="0">
-              <a:schemeClr val="accent1"/>
-            </a:effectRef>
-            <a:fontRef idx="minor">
-              <a:schemeClr val="lt1"/>
-            </a:fontRef>
-          </p:style>
-          <p:txBody>
-            <a:bodyPr rtlCol="0" anchor="ctr"/>
-            <a:lstStyle/>
-            <a:p>
-              <a:pPr algn="ctr"/>
-              <a:r>
-                <a:rPr kumimoji="1" lang="zh-CN" altLang="en-US" sz="1200" dirty="0">
-                  <a:solidFill>
-                    <a:schemeClr val="tx1"/>
-                  </a:solidFill>
-                </a:rPr>
-                <a:t>首页</a:t>
-              </a:r>
-            </a:p>
-          </p:txBody>
-        </p:sp>
-        <p:sp>
-          <p:nvSpPr>
-            <p:cNvPr id="11" name="圆角矩形 10">
-              <a:hlinkClick r:id="rId3" action="ppaction://hlinksldjump"/>
-              <a:extLst>
-                <a:ext uri="{FF2B5EF4-FFF2-40B4-BE49-F238E27FC236}">
-                  <a16:creationId xmlns:a16="http://schemas.microsoft.com/office/drawing/2014/main" id="{630AAFEF-2EBF-A04B-AF57-E5AEE84FE425}"/>
-                </a:ext>
-              </a:extLst>
-            </p:cNvPr>
-            <p:cNvSpPr/>
-            <p:nvPr/>
-          </p:nvSpPr>
-          <p:spPr>
-            <a:xfrm>
-              <a:off x="1954703" y="4976726"/>
-              <a:ext cx="535565" cy="423949"/>
-            </a:xfrm>
-            <a:prstGeom prst="roundRect">
-              <a:avLst/>
-            </a:prstGeom>
-            <a:solidFill>
-              <a:schemeClr val="bg1"/>
-            </a:solidFill>
-            <a:ln>
-              <a:noFill/>
-            </a:ln>
-          </p:spPr>
-          <p:style>
-            <a:lnRef idx="2">
-              <a:schemeClr val="accent1">
-                <a:shade val="50000"/>
-              </a:schemeClr>
-            </a:lnRef>
-            <a:fillRef idx="1">
-              <a:schemeClr val="accent1"/>
-            </a:fillRef>
-            <a:effectRef idx="0">
-              <a:schemeClr val="accent1"/>
-            </a:effectRef>
-            <a:fontRef idx="minor">
-              <a:schemeClr val="lt1"/>
-            </a:fontRef>
-          </p:style>
-          <p:txBody>
-            <a:bodyPr rtlCol="0" anchor="ctr"/>
-            <a:lstStyle/>
-            <a:p>
-              <a:pPr algn="ctr"/>
-              <a:r>
-                <a:rPr kumimoji="1" lang="zh-CN" altLang="en-US" sz="1200" dirty="0">
-                  <a:solidFill>
-                    <a:schemeClr val="tx1"/>
-                  </a:solidFill>
-                </a:rPr>
-                <a:t>我的</a:t>
-              </a:r>
-            </a:p>
-          </p:txBody>
-        </p:sp>
-      </p:grpSp>
-      <p:sp>
-        <p:nvSpPr>
-          <p:cNvPr id="12" name="燕尾形箭头 11">
-            <a:hlinkClick r:id="rId4" action="ppaction://hlinksldjump"/>
-            <a:extLst>
-              <a:ext uri="{FF2B5EF4-FFF2-40B4-BE49-F238E27FC236}">
-                <a16:creationId xmlns:a16="http://schemas.microsoft.com/office/drawing/2014/main" id="{0C4791E6-82C0-A55F-1583-C9796639260A}"/>
-              </a:ext>
-            </a:extLst>
-          </p:cNvPr>
-          <p:cNvSpPr/>
-          <p:nvPr/>
-        </p:nvSpPr>
-        <p:spPr>
-          <a:xfrm flipH="1">
-            <a:off x="29094" y="70001"/>
-            <a:ext cx="465208" cy="450482"/>
-          </a:xfrm>
-          <a:prstGeom prst="notchedRightArrow">
-            <a:avLst/>
-          </a:prstGeom>
-          <a:solidFill>
-            <a:schemeClr val="accent1"/>
-          </a:solidFill>
-          <a:ln>
-            <a:noFill/>
-          </a:ln>
-        </p:spPr>
-        <p:style>
-          <a:lnRef idx="0">
-            <a:scrgbClr r="0" g="0" b="0"/>
-          </a:lnRef>
-          <a:fillRef idx="0">
-            <a:scrgbClr r="0" g="0" b="0"/>
-          </a:fillRef>
-          <a:effectRef idx="0">
-            <a:scrgbClr r="0" g="0" b="0"/>
-          </a:effectRef>
-          <a:fontRef idx="minor">
-            <a:schemeClr val="lt1"/>
-          </a:fontRef>
-        </p:style>
-        <p:txBody>
-          <a:bodyPr rtlCol="0" anchor="ctr"/>
-          <a:lstStyle/>
-          <a:p>
-            <a:pPr algn="ctr"/>
-            <a:endParaRPr kumimoji="1" lang="zh-CN" altLang="en-US">
-              <a:ln w="0"/>
-              <a:solidFill>
-                <a:schemeClr val="accent1"/>
-              </a:solidFill>
-              <a:effectLst>
-                <a:outerShdw blurRad="38100" dist="25400" dir="5400000" algn="ctr" rotWithShape="0">
-                  <a:srgbClr val="6E747A">
-                    <a:alpha val="43000"/>
-                  </a:srgbClr>
-                </a:outerShdw>
-              </a:effectLst>
-            </a:endParaRPr>
-          </a:p>
-        </p:txBody>
-      </p:sp>
-      <p:sp>
-        <p:nvSpPr>
-          <p:cNvPr id="13" name="文本框 12">
-            <a:extLst>
-              <a:ext uri="{FF2B5EF4-FFF2-40B4-BE49-F238E27FC236}">
-                <a16:creationId xmlns:a16="http://schemas.microsoft.com/office/drawing/2014/main" id="{BC8236FC-74AF-9EB4-6E1F-EA6A0BF8C1E3}"/>
-              </a:ext>
-            </a:extLst>
-          </p:cNvPr>
-          <p:cNvSpPr txBox="1"/>
-          <p:nvPr/>
-        </p:nvSpPr>
-        <p:spPr>
-          <a:xfrm>
-            <a:off x="0" y="3067128"/>
-            <a:ext cx="2519363" cy="369332"/>
-          </a:xfrm>
-          <a:prstGeom prst="rect">
-            <a:avLst/>
-          </a:prstGeom>
-          <a:solidFill>
-            <a:srgbClr val="B993A0">
-              <a:alpha val="52834"/>
-            </a:srgbClr>
-          </a:solidFill>
-          <a:ln>
-            <a:solidFill>
-              <a:schemeClr val="bg2">
-                <a:lumMod val="90000"/>
-              </a:schemeClr>
-            </a:solidFill>
-          </a:ln>
-        </p:spPr>
-        <p:txBody>
-          <a:bodyPr wrap="square" rtlCol="0">
-            <a:spAutoFit/>
-          </a:bodyPr>
-          <a:lstStyle/>
-          <a:p>
-            <a:r>
-              <a:rPr kumimoji="1" lang="zh-CN" altLang="en-US" dirty="0"/>
-              <a:t>选项</a:t>
-            </a:r>
-            <a:r>
-              <a:rPr kumimoji="1" lang="en-US" altLang="zh-CN" dirty="0"/>
-              <a:t>b</a:t>
-            </a:r>
-            <a:endParaRPr kumimoji="1" lang="zh-CN" altLang="en-US" dirty="0"/>
-          </a:p>
-        </p:txBody>
-      </p:sp>
-      <p:sp>
-        <p:nvSpPr>
-          <p:cNvPr id="14" name="文本框 13">
-            <a:extLst>
-              <a:ext uri="{FF2B5EF4-FFF2-40B4-BE49-F238E27FC236}">
-                <a16:creationId xmlns:a16="http://schemas.microsoft.com/office/drawing/2014/main" id="{922F65F1-8DC4-BD23-4E0B-016940F72731}"/>
-              </a:ext>
-            </a:extLst>
-          </p:cNvPr>
-          <p:cNvSpPr txBox="1"/>
-          <p:nvPr/>
-        </p:nvSpPr>
-        <p:spPr>
-          <a:xfrm>
-            <a:off x="29094" y="3511540"/>
-            <a:ext cx="2519363" cy="369332"/>
-          </a:xfrm>
-          <a:prstGeom prst="rect">
-            <a:avLst/>
-          </a:prstGeom>
-          <a:solidFill>
-            <a:srgbClr val="B993A0">
-              <a:alpha val="52834"/>
-            </a:srgbClr>
-          </a:solidFill>
-          <a:ln>
-            <a:solidFill>
-              <a:schemeClr val="bg2">
-                <a:lumMod val="90000"/>
-              </a:schemeClr>
-            </a:solidFill>
-          </a:ln>
-        </p:spPr>
-        <p:txBody>
-          <a:bodyPr wrap="square" rtlCol="0">
-            <a:spAutoFit/>
-          </a:bodyPr>
-          <a:lstStyle/>
-          <a:p>
-            <a:r>
-              <a:rPr kumimoji="1" lang="zh-CN" altLang="en-US" dirty="0"/>
-              <a:t>选项</a:t>
-            </a:r>
-            <a:r>
-              <a:rPr kumimoji="1" lang="en-US" altLang="zh-CN" dirty="0"/>
-              <a:t>c</a:t>
-            </a:r>
-            <a:endParaRPr kumimoji="1" lang="zh-CN" altLang="en-US" dirty="0"/>
-          </a:p>
-        </p:txBody>
-      </p:sp>
-      <p:sp>
-        <p:nvSpPr>
-          <p:cNvPr id="15" name="文本框 14">
-            <a:extLst>
-              <a:ext uri="{FF2B5EF4-FFF2-40B4-BE49-F238E27FC236}">
-                <a16:creationId xmlns:a16="http://schemas.microsoft.com/office/drawing/2014/main" id="{2318C478-FCB1-8806-64A6-06D7D5CB06A4}"/>
-              </a:ext>
-            </a:extLst>
-          </p:cNvPr>
-          <p:cNvSpPr txBox="1"/>
-          <p:nvPr/>
-        </p:nvSpPr>
-        <p:spPr>
-          <a:xfrm>
-            <a:off x="29094" y="3888917"/>
-            <a:ext cx="2519363" cy="369332"/>
-          </a:xfrm>
-          <a:prstGeom prst="rect">
-            <a:avLst/>
-          </a:prstGeom>
-          <a:solidFill>
-            <a:srgbClr val="B993A0">
-              <a:alpha val="52834"/>
-            </a:srgbClr>
-          </a:solidFill>
-          <a:ln>
-            <a:solidFill>
-              <a:schemeClr val="bg2">
-                <a:lumMod val="90000"/>
-              </a:schemeClr>
-            </a:solidFill>
-          </a:ln>
-        </p:spPr>
-        <p:txBody>
-          <a:bodyPr wrap="square" rtlCol="0">
-            <a:spAutoFit/>
-          </a:bodyPr>
-          <a:lstStyle/>
-          <a:p>
-            <a:r>
-              <a:rPr kumimoji="1" lang="zh-CN" altLang="en-US" dirty="0"/>
-              <a:t>选项</a:t>
-            </a:r>
-            <a:r>
-              <a:rPr kumimoji="1" lang="en-US" altLang="zh-CN" dirty="0"/>
-              <a:t>d</a:t>
-            </a:r>
-            <a:endParaRPr kumimoji="1" lang="zh-CN" altLang="en-US" dirty="0"/>
-          </a:p>
-        </p:txBody>
-      </p:sp>
-      <p:sp>
-        <p:nvSpPr>
-          <p:cNvPr id="16" name="文本框 15">
-            <a:extLst>
-              <a:ext uri="{FF2B5EF4-FFF2-40B4-BE49-F238E27FC236}">
-                <a16:creationId xmlns:a16="http://schemas.microsoft.com/office/drawing/2014/main" id="{635650C1-63AC-3BF5-CAE0-D51346CAA3D1}"/>
-              </a:ext>
-            </a:extLst>
-          </p:cNvPr>
-          <p:cNvSpPr txBox="1"/>
-          <p:nvPr/>
-        </p:nvSpPr>
-        <p:spPr>
-          <a:xfrm>
-            <a:off x="0" y="4408508"/>
-            <a:ext cx="868681" cy="369332"/>
-          </a:xfrm>
-          <a:prstGeom prst="rect">
-            <a:avLst/>
-          </a:prstGeom>
-          <a:solidFill>
-            <a:srgbClr val="B993A0">
-              <a:alpha val="52834"/>
-            </a:srgbClr>
-          </a:solidFill>
-          <a:ln>
-            <a:solidFill>
-              <a:schemeClr val="bg2">
-                <a:lumMod val="90000"/>
-              </a:schemeClr>
-            </a:solidFill>
-          </a:ln>
-        </p:spPr>
-        <p:txBody>
-          <a:bodyPr wrap="square" rtlCol="0">
-            <a:spAutoFit/>
-          </a:bodyPr>
-          <a:lstStyle/>
-          <a:p>
-            <a:r>
-              <a:rPr kumimoji="1" lang="zh-CN" altLang="en-US" dirty="0"/>
-              <a:t>上一题</a:t>
-            </a:r>
-          </a:p>
-        </p:txBody>
-      </p:sp>
-      <p:sp>
-        <p:nvSpPr>
-          <p:cNvPr id="17" name="文本框 16">
-            <a:extLst>
-              <a:ext uri="{FF2B5EF4-FFF2-40B4-BE49-F238E27FC236}">
-                <a16:creationId xmlns:a16="http://schemas.microsoft.com/office/drawing/2014/main" id="{3F131ECF-4E8A-5C46-547A-BB971FC925E9}"/>
-              </a:ext>
-            </a:extLst>
-          </p:cNvPr>
-          <p:cNvSpPr txBox="1"/>
-          <p:nvPr/>
-        </p:nvSpPr>
-        <p:spPr>
-          <a:xfrm>
-            <a:off x="1520362" y="4432821"/>
-            <a:ext cx="868681" cy="923330"/>
-          </a:xfrm>
-          <a:prstGeom prst="rect">
-            <a:avLst/>
-          </a:prstGeom>
-          <a:solidFill>
-            <a:srgbClr val="B993A0">
-              <a:alpha val="52834"/>
-            </a:srgbClr>
-          </a:solidFill>
-          <a:ln>
-            <a:solidFill>
-              <a:schemeClr val="bg2">
-                <a:lumMod val="90000"/>
-              </a:schemeClr>
-            </a:solidFill>
-          </a:ln>
-        </p:spPr>
-        <p:txBody>
-          <a:bodyPr wrap="square" rtlCol="0">
-            <a:spAutoFit/>
-          </a:bodyPr>
-          <a:lstStyle/>
-          <a:p>
-            <a:r>
-              <a:rPr kumimoji="1" lang="zh-CN" altLang="en-US" dirty="0"/>
-              <a:t>下一题（出结果）</a:t>
-            </a:r>
-          </a:p>
-        </p:txBody>
-      </p:sp>
-    </p:spTree>
-    <p:extLst>
-      <p:ext uri="{BB962C8B-B14F-4D97-AF65-F5344CB8AC3E}">
-        <p14:creationId xmlns:p14="http://schemas.microsoft.com/office/powerpoint/2010/main" val="1293702325"/>
       </p:ext>
     </p:extLst>
   </p:cSld>

</xml_diff>